<commit_message>
Single word gives accurate results, multi-word not that much as it uses UNION and not the indexes
</commit_message>
<xml_diff>
--- a/Google 2.pptx
+++ b/Google 2.pptx
@@ -5,31 +5,30 @@
     <p:sldMasterId id="2147483660" r:id="rId1"/>
   </p:sldMasterIdLst>
   <p:notesMasterIdLst>
-    <p:notesMasterId r:id="rId21"/>
+    <p:notesMasterId r:id="rId20"/>
   </p:notesMasterIdLst>
   <p:handoutMasterIdLst>
-    <p:handoutMasterId r:id="rId22"/>
+    <p:handoutMasterId r:id="rId21"/>
   </p:handoutMasterIdLst>
   <p:sldIdLst>
     <p:sldId id="256" r:id="rId2"/>
-    <p:sldId id="311" r:id="rId3"/>
-    <p:sldId id="301" r:id="rId4"/>
-    <p:sldId id="292" r:id="rId5"/>
-    <p:sldId id="312" r:id="rId6"/>
-    <p:sldId id="306" r:id="rId7"/>
-    <p:sldId id="309" r:id="rId8"/>
-    <p:sldId id="310" r:id="rId9"/>
-    <p:sldId id="305" r:id="rId10"/>
-    <p:sldId id="293" r:id="rId11"/>
-    <p:sldId id="294" r:id="rId12"/>
-    <p:sldId id="308" r:id="rId13"/>
-    <p:sldId id="307" r:id="rId14"/>
-    <p:sldId id="295" r:id="rId15"/>
-    <p:sldId id="298" r:id="rId16"/>
-    <p:sldId id="304" r:id="rId17"/>
-    <p:sldId id="296" r:id="rId18"/>
-    <p:sldId id="302" r:id="rId19"/>
-    <p:sldId id="313" r:id="rId20"/>
+    <p:sldId id="301" r:id="rId3"/>
+    <p:sldId id="292" r:id="rId4"/>
+    <p:sldId id="312" r:id="rId5"/>
+    <p:sldId id="306" r:id="rId6"/>
+    <p:sldId id="309" r:id="rId7"/>
+    <p:sldId id="310" r:id="rId8"/>
+    <p:sldId id="305" r:id="rId9"/>
+    <p:sldId id="293" r:id="rId10"/>
+    <p:sldId id="294" r:id="rId11"/>
+    <p:sldId id="308" r:id="rId12"/>
+    <p:sldId id="307" r:id="rId13"/>
+    <p:sldId id="295" r:id="rId14"/>
+    <p:sldId id="298" r:id="rId15"/>
+    <p:sldId id="304" r:id="rId16"/>
+    <p:sldId id="296" r:id="rId17"/>
+    <p:sldId id="302" r:id="rId18"/>
+    <p:sldId id="313" r:id="rId19"/>
   </p:sldIdLst>
   <p:sldSz cx="12192000" cy="6858000"/>
   <p:notesSz cx="6858000" cy="9144000"/>
@@ -164,14 +163,8 @@
 <file path=ppt/commentAuthors.xml><?xml version="1.0" encoding="utf-8"?>
 <p:cmAuthorLst xmlns:a="http://schemas.openxmlformats.org/drawingml/2006/main" xmlns:r="http://schemas.openxmlformats.org/officeDocument/2006/relationships" xmlns:p="http://schemas.openxmlformats.org/presentationml/2006/main">
   <p:cmAuthor id="2" name="Author" initials="A" lastIdx="0" clrIdx="1"/>
-  <p:cmAuthor id="3" name="Samantha Robertson" initials="SR" lastIdx="1" clrIdx="2">
-    <p:extLst/>
-  </p:cmAuthor>
+  <p:cmAuthor id="3" name="Samantha Robertson" initials="SR" lastIdx="1" clrIdx="2"/>
 </p:cmAuthorLst>
-</file>
-
-<file path=ppt/revisionInfo.xml><?xml version="1.0" encoding="utf-8"?>
-<p1510:revInfo xmlns:a="http://schemas.openxmlformats.org/drawingml/2006/main" xmlns:r="http://schemas.openxmlformats.org/officeDocument/2006/relationships" xmlns:p1510="http://schemas.microsoft.com/office/powerpoint/2015/10/main"/>
 </file>
 
 <file path=ppt/handoutMasters/handoutMaster1.xml><?xml version="1.0" encoding="utf-8"?>
@@ -256,7 +249,7 @@
           <a:p>
             <a:fld id="{80680FBE-A8DF-4758-9AC4-3A9E1039168F}" type="datetimeFigureOut">
               <a:rPr lang="en-US" smtClean="0"/>
-              <a:t>12/28/2018</a:t>
+              <a:t>2/27/2020</a:t>
             </a:fld>
             <a:endParaRPr lang="en-US" dirty="0"/>
           </a:p>
@@ -421,7 +414,7 @@
           <a:p>
             <a:fld id="{EC13577B-6902-467D-A26C-08A0DD5E4E03}" type="datetimeFigureOut">
               <a:rPr lang="en-US" smtClean="0"/>
-              <a:t>12/28/2018</a:t>
+              <a:t>2/27/2020</a:t>
             </a:fld>
             <a:endParaRPr lang="en-US" dirty="0"/>
           </a:p>
@@ -919,7 +912,7 @@
           </a:lstStyle>
           <a:p>
             <a:r>
-              <a:rPr lang="en-US" smtClean="0"/>
+              <a:rPr lang="en-US"/>
               <a:t>Click to edit Master title style</a:t>
             </a:r>
             <a:endParaRPr lang="en-US" dirty="0"/>
@@ -972,10 +965,9 @@
           <a:lstStyle/>
           <a:p>
             <a:r>
-              <a:rPr lang="en-US" smtClean="0"/>
+              <a:rPr lang="en-US"/>
               <a:t>Click to edit Master title style</a:t>
             </a:r>
-            <a:endParaRPr lang="en-US"/>
           </a:p>
         </p:txBody>
       </p:sp>
@@ -996,38 +988,37 @@
           <a:p>
             <a:pPr lvl="0"/>
             <a:r>
-              <a:rPr lang="en-US" smtClean="0"/>
+              <a:rPr lang="en-US"/>
               <a:t>Edit Master text styles</a:t>
             </a:r>
           </a:p>
           <a:p>
             <a:pPr lvl="1"/>
             <a:r>
-              <a:rPr lang="en-US" smtClean="0"/>
+              <a:rPr lang="en-US"/>
               <a:t>Second level</a:t>
             </a:r>
           </a:p>
           <a:p>
             <a:pPr lvl="2"/>
             <a:r>
-              <a:rPr lang="en-US" smtClean="0"/>
+              <a:rPr lang="en-US"/>
               <a:t>Third level</a:t>
             </a:r>
           </a:p>
           <a:p>
             <a:pPr lvl="3"/>
             <a:r>
-              <a:rPr lang="en-US" smtClean="0"/>
+              <a:rPr lang="en-US"/>
               <a:t>Fourth level</a:t>
             </a:r>
           </a:p>
           <a:p>
             <a:pPr lvl="4"/>
             <a:r>
-              <a:rPr lang="en-US" smtClean="0"/>
+              <a:rPr lang="en-US"/>
               <a:t>Fifth level</a:t>
             </a:r>
-            <a:endParaRPr lang="en-US"/>
           </a:p>
         </p:txBody>
       </p:sp>
@@ -1048,7 +1039,7 @@
           <a:p>
             <a:fld id="{BC19B319-C798-432B-9DC1-8CA7D5CF526F}" type="datetime1">
               <a:rPr lang="en-US" smtClean="0"/>
-              <a:t>12/28/2018</a:t>
+              <a:t>2/27/2020</a:t>
             </a:fld>
             <a:endParaRPr lang="en-US"/>
           </a:p>
@@ -1070,10 +1061,9 @@
           <a:lstStyle/>
           <a:p>
             <a:r>
-              <a:rPr lang="en-US" smtClean="0"/>
+              <a:rPr lang="en-US"/>
               <a:t>Add a footer</a:t>
             </a:r>
-            <a:endParaRPr lang="en-US"/>
           </a:p>
         </p:txBody>
       </p:sp>
@@ -1151,7 +1141,7 @@
           <a:lstStyle/>
           <a:p>
             <a:r>
-              <a:rPr lang="en-US" smtClean="0"/>
+              <a:rPr lang="en-US"/>
               <a:t>Click to edit Master title style</a:t>
             </a:r>
             <a:endParaRPr lang="en-US" dirty="0"/>
@@ -1180,38 +1170,37 @@
           <a:p>
             <a:pPr lvl="0"/>
             <a:r>
-              <a:rPr lang="en-US" smtClean="0"/>
+              <a:rPr lang="en-US"/>
               <a:t>Edit Master text styles</a:t>
             </a:r>
           </a:p>
           <a:p>
             <a:pPr lvl="1"/>
             <a:r>
-              <a:rPr lang="en-US" smtClean="0"/>
+              <a:rPr lang="en-US"/>
               <a:t>Second level</a:t>
             </a:r>
           </a:p>
           <a:p>
             <a:pPr lvl="2"/>
             <a:r>
-              <a:rPr lang="en-US" smtClean="0"/>
+              <a:rPr lang="en-US"/>
               <a:t>Third level</a:t>
             </a:r>
           </a:p>
           <a:p>
             <a:pPr lvl="3"/>
             <a:r>
-              <a:rPr lang="en-US" smtClean="0"/>
+              <a:rPr lang="en-US"/>
               <a:t>Fourth level</a:t>
             </a:r>
           </a:p>
           <a:p>
             <a:pPr lvl="4"/>
             <a:r>
-              <a:rPr lang="en-US" smtClean="0"/>
+              <a:rPr lang="en-US"/>
               <a:t>Fifth level</a:t>
             </a:r>
-            <a:endParaRPr lang="en-US"/>
           </a:p>
         </p:txBody>
       </p:sp>
@@ -1232,7 +1221,7 @@
           <a:p>
             <a:fld id="{C971245D-9EEE-4A70-8B08-E983D54799F2}" type="datetime1">
               <a:rPr lang="en-US" smtClean="0"/>
-              <a:t>12/28/2018</a:t>
+              <a:t>2/27/2020</a:t>
             </a:fld>
             <a:endParaRPr lang="en-US"/>
           </a:p>
@@ -1254,10 +1243,9 @@
           <a:lstStyle/>
           <a:p>
             <a:r>
-              <a:rPr lang="en-US" smtClean="0"/>
+              <a:rPr lang="en-US"/>
               <a:t>Add a footer</a:t>
             </a:r>
-            <a:endParaRPr lang="en-US"/>
           </a:p>
         </p:txBody>
       </p:sp>
@@ -1432,7 +1420,7 @@
           <a:lstStyle/>
           <a:p>
             <a:r>
-              <a:rPr lang="en-US" smtClean="0"/>
+              <a:rPr lang="en-US"/>
               <a:t>Click to edit Master title style</a:t>
             </a:r>
             <a:endParaRPr lang="en-US" dirty="0"/>
@@ -1461,35 +1449,35 @@
           <a:p>
             <a:pPr lvl="0"/>
             <a:r>
-              <a:rPr lang="en-US" smtClean="0"/>
+              <a:rPr lang="en-US"/>
               <a:t>Edit Master text styles</a:t>
             </a:r>
           </a:p>
           <a:p>
             <a:pPr lvl="1"/>
             <a:r>
-              <a:rPr lang="en-US" smtClean="0"/>
+              <a:rPr lang="en-US"/>
               <a:t>Second level</a:t>
             </a:r>
           </a:p>
           <a:p>
             <a:pPr lvl="2"/>
             <a:r>
-              <a:rPr lang="en-US" smtClean="0"/>
+              <a:rPr lang="en-US"/>
               <a:t>Third level</a:t>
             </a:r>
           </a:p>
           <a:p>
             <a:pPr lvl="3"/>
             <a:r>
-              <a:rPr lang="en-US" smtClean="0"/>
+              <a:rPr lang="en-US"/>
               <a:t>Fourth level</a:t>
             </a:r>
           </a:p>
           <a:p>
             <a:pPr lvl="4"/>
             <a:r>
-              <a:rPr lang="en-US" smtClean="0"/>
+              <a:rPr lang="en-US"/>
               <a:t>Fifth level</a:t>
             </a:r>
             <a:endParaRPr lang="en-US" dirty="0"/>
@@ -1513,7 +1501,7 @@
           <a:p>
             <a:fld id="{8390EA52-3F6B-42D8-8234-AE2EF308135C}" type="datetime1">
               <a:rPr lang="en-US" smtClean="0"/>
-              <a:t>12/28/2018</a:t>
+              <a:t>2/27/2020</a:t>
             </a:fld>
             <a:endParaRPr lang="en-US" dirty="0"/>
           </a:p>
@@ -1623,7 +1611,7 @@
           </a:lstStyle>
           <a:p>
             <a:r>
-              <a:rPr lang="en-US" smtClean="0"/>
+              <a:rPr lang="en-US"/>
               <a:t>Click to edit Master title style</a:t>
             </a:r>
             <a:endParaRPr lang="en-US" dirty="0"/>
@@ -1743,7 +1731,7 @@
           <a:p>
             <a:pPr lvl="0"/>
             <a:r>
-              <a:rPr lang="en-US" smtClean="0"/>
+              <a:rPr lang="en-US"/>
               <a:t>Edit Master text styles</a:t>
             </a:r>
           </a:p>
@@ -1766,7 +1754,7 @@
           <a:p>
             <a:fld id="{9CF0B3C1-54EB-4721-B476-9FC08CA6D1DF}" type="datetime1">
               <a:rPr lang="en-US" smtClean="0"/>
-              <a:t>12/28/2018</a:t>
+              <a:t>2/27/2020</a:t>
             </a:fld>
             <a:endParaRPr lang="en-US"/>
           </a:p>
@@ -1788,10 +1776,9 @@
           <a:lstStyle/>
           <a:p>
             <a:r>
-              <a:rPr lang="en-US" smtClean="0"/>
+              <a:rPr lang="en-US"/>
               <a:t>Add a footer</a:t>
             </a:r>
-            <a:endParaRPr lang="en-US"/>
           </a:p>
         </p:txBody>
       </p:sp>
@@ -1869,7 +1856,7 @@
           <a:lstStyle/>
           <a:p>
             <a:r>
-              <a:rPr lang="en-US" smtClean="0"/>
+              <a:rPr lang="en-US"/>
               <a:t>Click to edit Master title style</a:t>
             </a:r>
             <a:endParaRPr lang="en-US" dirty="0"/>
@@ -1898,35 +1885,35 @@
           <a:p>
             <a:pPr lvl="0"/>
             <a:r>
-              <a:rPr lang="en-US" smtClean="0"/>
+              <a:rPr lang="en-US"/>
               <a:t>Edit Master text styles</a:t>
             </a:r>
           </a:p>
           <a:p>
             <a:pPr lvl="1"/>
             <a:r>
-              <a:rPr lang="en-US" smtClean="0"/>
+              <a:rPr lang="en-US"/>
               <a:t>Second level</a:t>
             </a:r>
           </a:p>
           <a:p>
             <a:pPr lvl="2"/>
             <a:r>
-              <a:rPr lang="en-US" smtClean="0"/>
+              <a:rPr lang="en-US"/>
               <a:t>Third level</a:t>
             </a:r>
           </a:p>
           <a:p>
             <a:pPr lvl="3"/>
             <a:r>
-              <a:rPr lang="en-US" smtClean="0"/>
+              <a:rPr lang="en-US"/>
               <a:t>Fourth level</a:t>
             </a:r>
           </a:p>
           <a:p>
             <a:pPr lvl="4"/>
             <a:r>
-              <a:rPr lang="en-US" smtClean="0"/>
+              <a:rPr lang="en-US"/>
               <a:t>Fifth level</a:t>
             </a:r>
             <a:endParaRPr lang="en-US" dirty="0"/>
@@ -1955,38 +1942,37 @@
           <a:p>
             <a:pPr lvl="0"/>
             <a:r>
-              <a:rPr lang="en-US" smtClean="0"/>
+              <a:rPr lang="en-US"/>
               <a:t>Edit Master text styles</a:t>
             </a:r>
           </a:p>
           <a:p>
             <a:pPr lvl="1"/>
             <a:r>
-              <a:rPr lang="en-US" smtClean="0"/>
+              <a:rPr lang="en-US"/>
               <a:t>Second level</a:t>
             </a:r>
           </a:p>
           <a:p>
             <a:pPr lvl="2"/>
             <a:r>
-              <a:rPr lang="en-US" smtClean="0"/>
+              <a:rPr lang="en-US"/>
               <a:t>Third level</a:t>
             </a:r>
           </a:p>
           <a:p>
             <a:pPr lvl="3"/>
             <a:r>
-              <a:rPr lang="en-US" smtClean="0"/>
+              <a:rPr lang="en-US"/>
               <a:t>Fourth level</a:t>
             </a:r>
           </a:p>
           <a:p>
             <a:pPr lvl="4"/>
             <a:r>
-              <a:rPr lang="en-US" smtClean="0"/>
+              <a:rPr lang="en-US"/>
               <a:t>Fifth level</a:t>
             </a:r>
-            <a:endParaRPr lang="en-US"/>
           </a:p>
         </p:txBody>
       </p:sp>
@@ -2007,7 +1993,7 @@
           <a:p>
             <a:fld id="{E09E7A3A-3D7E-49BA-9260-C277BBD3A846}" type="datetime1">
               <a:rPr lang="en-US" smtClean="0"/>
-              <a:t>12/28/2018</a:t>
+              <a:t>2/27/2020</a:t>
             </a:fld>
             <a:endParaRPr lang="en-US"/>
           </a:p>
@@ -2029,10 +2015,9 @@
           <a:lstStyle/>
           <a:p>
             <a:r>
-              <a:rPr lang="en-US" smtClean="0"/>
+              <a:rPr lang="en-US"/>
               <a:t>Add a footer</a:t>
             </a:r>
-            <a:endParaRPr lang="en-US"/>
           </a:p>
         </p:txBody>
       </p:sp>
@@ -2148,7 +2133,7 @@
           <a:p>
             <a:pPr lvl="0"/>
             <a:r>
-              <a:rPr lang="en-US" smtClean="0"/>
+              <a:rPr lang="en-US"/>
               <a:t>Edit Master text styles</a:t>
             </a:r>
           </a:p>
@@ -2176,38 +2161,37 @@
           <a:p>
             <a:pPr lvl="0"/>
             <a:r>
-              <a:rPr lang="en-US" smtClean="0"/>
+              <a:rPr lang="en-US"/>
               <a:t>Edit Master text styles</a:t>
             </a:r>
           </a:p>
           <a:p>
             <a:pPr lvl="1"/>
             <a:r>
-              <a:rPr lang="en-US" smtClean="0"/>
+              <a:rPr lang="en-US"/>
               <a:t>Second level</a:t>
             </a:r>
           </a:p>
           <a:p>
             <a:pPr lvl="2"/>
             <a:r>
-              <a:rPr lang="en-US" smtClean="0"/>
+              <a:rPr lang="en-US"/>
               <a:t>Third level</a:t>
             </a:r>
           </a:p>
           <a:p>
             <a:pPr lvl="3"/>
             <a:r>
-              <a:rPr lang="en-US" smtClean="0"/>
+              <a:rPr lang="en-US"/>
               <a:t>Fourth level</a:t>
             </a:r>
           </a:p>
           <a:p>
             <a:pPr lvl="4"/>
             <a:r>
-              <a:rPr lang="en-US" smtClean="0"/>
+              <a:rPr lang="en-US"/>
               <a:t>Fifth level</a:t>
             </a:r>
-            <a:endParaRPr lang="en-US"/>
           </a:p>
         </p:txBody>
       </p:sp>
@@ -2270,7 +2254,7 @@
           <a:p>
             <a:pPr lvl="0"/>
             <a:r>
-              <a:rPr lang="en-US" smtClean="0"/>
+              <a:rPr lang="en-US"/>
               <a:t>Edit Master text styles</a:t>
             </a:r>
           </a:p>
@@ -2298,38 +2282,37 @@
           <a:p>
             <a:pPr lvl="0"/>
             <a:r>
-              <a:rPr lang="en-US" smtClean="0"/>
+              <a:rPr lang="en-US"/>
               <a:t>Edit Master text styles</a:t>
             </a:r>
           </a:p>
           <a:p>
             <a:pPr lvl="1"/>
             <a:r>
-              <a:rPr lang="en-US" smtClean="0"/>
+              <a:rPr lang="en-US"/>
               <a:t>Second level</a:t>
             </a:r>
           </a:p>
           <a:p>
             <a:pPr lvl="2"/>
             <a:r>
-              <a:rPr lang="en-US" smtClean="0"/>
+              <a:rPr lang="en-US"/>
               <a:t>Third level</a:t>
             </a:r>
           </a:p>
           <a:p>
             <a:pPr lvl="3"/>
             <a:r>
-              <a:rPr lang="en-US" smtClean="0"/>
+              <a:rPr lang="en-US"/>
               <a:t>Fourth level</a:t>
             </a:r>
           </a:p>
           <a:p>
             <a:pPr lvl="4"/>
             <a:r>
-              <a:rPr lang="en-US" smtClean="0"/>
+              <a:rPr lang="en-US"/>
               <a:t>Fifth level</a:t>
             </a:r>
-            <a:endParaRPr lang="en-US"/>
           </a:p>
         </p:txBody>
       </p:sp>
@@ -2350,7 +2333,7 @@
           <a:p>
             <a:fld id="{D952123D-9A92-4F7E-86DB-9069CBF318EC}" type="datetime1">
               <a:rPr lang="en-US" smtClean="0"/>
-              <a:t>12/28/2018</a:t>
+              <a:t>2/27/2020</a:t>
             </a:fld>
             <a:endParaRPr lang="en-US"/>
           </a:p>
@@ -2372,10 +2355,9 @@
           <a:lstStyle/>
           <a:p>
             <a:r>
-              <a:rPr lang="en-US" smtClean="0"/>
+              <a:rPr lang="en-US"/>
               <a:t>Add a footer</a:t>
             </a:r>
-            <a:endParaRPr lang="en-US"/>
           </a:p>
         </p:txBody>
       </p:sp>
@@ -2428,10 +2410,9 @@
           <a:lstStyle/>
           <a:p>
             <a:r>
-              <a:rPr lang="en-US" smtClean="0"/>
+              <a:rPr lang="en-US"/>
               <a:t>Click to edit Master title style</a:t>
             </a:r>
-            <a:endParaRPr lang="en-US"/>
           </a:p>
         </p:txBody>
       </p:sp>
@@ -2481,7 +2462,7 @@
           <a:lstStyle/>
           <a:p>
             <a:r>
-              <a:rPr lang="en-US" smtClean="0"/>
+              <a:rPr lang="en-US"/>
               <a:t>Click to edit Master title style</a:t>
             </a:r>
             <a:endParaRPr lang="en-US" dirty="0"/>
@@ -2513,7 +2494,7 @@
           <a:p>
             <a:fld id="{360FF590-8117-42D1-80FD-7EB36D00AD00}" type="datetime1">
               <a:rPr lang="en-US" smtClean="0"/>
-              <a:t>12/28/2018</a:t>
+              <a:t>2/27/2020</a:t>
             </a:fld>
             <a:endParaRPr lang="en-US" dirty="0"/>
           </a:p>
@@ -2628,7 +2609,7 @@
           <a:p>
             <a:fld id="{1D526E38-4A5D-4A9C-8328-55AC04AC02EF}" type="datetime1">
               <a:rPr lang="en-US" smtClean="0"/>
-              <a:t>12/28/2018</a:t>
+              <a:t>2/27/2020</a:t>
             </a:fld>
             <a:endParaRPr lang="en-US"/>
           </a:p>
@@ -2650,10 +2631,9 @@
           <a:lstStyle/>
           <a:p>
             <a:r>
-              <a:rPr lang="en-US" smtClean="0"/>
+              <a:rPr lang="en-US"/>
               <a:t>Add a footer</a:t>
             </a:r>
-            <a:endParaRPr lang="en-US"/>
           </a:p>
         </p:txBody>
       </p:sp>
@@ -2735,7 +2715,7 @@
           </a:lstStyle>
           <a:p>
             <a:r>
-              <a:rPr lang="en-US" smtClean="0"/>
+              <a:rPr lang="en-US"/>
               <a:t>Click to edit Master title style</a:t>
             </a:r>
             <a:endParaRPr lang="en-US" dirty="0"/>
@@ -2792,35 +2772,35 @@
           <a:p>
             <a:pPr lvl="0"/>
             <a:r>
-              <a:rPr lang="en-US" smtClean="0"/>
+              <a:rPr lang="en-US"/>
               <a:t>Edit Master text styles</a:t>
             </a:r>
           </a:p>
           <a:p>
             <a:pPr lvl="1"/>
             <a:r>
-              <a:rPr lang="en-US" smtClean="0"/>
+              <a:rPr lang="en-US"/>
               <a:t>Second level</a:t>
             </a:r>
           </a:p>
           <a:p>
             <a:pPr lvl="2"/>
             <a:r>
-              <a:rPr lang="en-US" smtClean="0"/>
+              <a:rPr lang="en-US"/>
               <a:t>Third level</a:t>
             </a:r>
           </a:p>
           <a:p>
             <a:pPr lvl="3"/>
             <a:r>
-              <a:rPr lang="en-US" smtClean="0"/>
+              <a:rPr lang="en-US"/>
               <a:t>Fourth level</a:t>
             </a:r>
           </a:p>
           <a:p>
             <a:pPr lvl="4"/>
             <a:r>
-              <a:rPr lang="en-US" smtClean="0"/>
+              <a:rPr lang="en-US"/>
               <a:t>Fifth level</a:t>
             </a:r>
             <a:endParaRPr lang="en-US" dirty="0"/>
@@ -2886,7 +2866,7 @@
           <a:p>
             <a:pPr lvl="0"/>
             <a:r>
-              <a:rPr lang="en-US" smtClean="0"/>
+              <a:rPr lang="en-US"/>
               <a:t>Edit Master text styles</a:t>
             </a:r>
           </a:p>
@@ -2909,7 +2889,7 @@
           <a:p>
             <a:fld id="{2465DC03-EB61-4CA4-8CB8-EB68A296F464}" type="datetime1">
               <a:rPr lang="en-US" smtClean="0"/>
-              <a:t>12/28/2018</a:t>
+              <a:t>2/27/2020</a:t>
             </a:fld>
             <a:endParaRPr lang="en-US"/>
           </a:p>
@@ -2931,10 +2911,9 @@
           <a:lstStyle/>
           <a:p>
             <a:r>
-              <a:rPr lang="en-US" smtClean="0"/>
+              <a:rPr lang="en-US"/>
               <a:t>Add a footer</a:t>
             </a:r>
-            <a:endParaRPr lang="en-US"/>
           </a:p>
         </p:txBody>
       </p:sp>
@@ -3021,7 +3000,7 @@
           </a:lstStyle>
           <a:p>
             <a:r>
-              <a:rPr lang="en-US" smtClean="0"/>
+              <a:rPr lang="en-US"/>
               <a:t>Click to edit Master title style</a:t>
             </a:r>
             <a:endParaRPr lang="en-US" dirty="0"/>
@@ -3086,10 +3065,9 @@
           </a:lstStyle>
           <a:p>
             <a:r>
-              <a:rPr lang="en-US" smtClean="0"/>
+              <a:rPr lang="en-US"/>
               <a:t>Click icon to add picture</a:t>
             </a:r>
-            <a:endParaRPr lang="en-US"/>
           </a:p>
         </p:txBody>
       </p:sp>
@@ -3152,7 +3130,7 @@
           <a:p>
             <a:pPr lvl="0"/>
             <a:r>
-              <a:rPr lang="en-US" smtClean="0"/>
+              <a:rPr lang="en-US"/>
               <a:t>Edit Master text styles</a:t>
             </a:r>
           </a:p>
@@ -3175,7 +3153,7 @@
           <a:p>
             <a:fld id="{55BD38C6-E644-47F5-84FB-2B999F7FD2EF}" type="datetime1">
               <a:rPr lang="en-US" smtClean="0"/>
-              <a:t>12/28/2018</a:t>
+              <a:t>2/27/2020</a:t>
             </a:fld>
             <a:endParaRPr lang="en-US"/>
           </a:p>
@@ -3197,10 +3175,9 @@
           <a:lstStyle/>
           <a:p>
             <a:r>
-              <a:rPr lang="en-US" smtClean="0"/>
+              <a:rPr lang="en-US"/>
               <a:t>Add a footer</a:t>
             </a:r>
-            <a:endParaRPr lang="en-US"/>
           </a:p>
         </p:txBody>
       </p:sp>
@@ -3341,7 +3318,7 @@
           <a:lstStyle/>
           <a:p>
             <a:r>
-              <a:rPr lang="en-US" smtClean="0"/>
+              <a:rPr lang="en-US"/>
               <a:t>Click to edit Master title style</a:t>
             </a:r>
             <a:endParaRPr lang="en-US" dirty="0"/>
@@ -3463,7 +3440,7 @@
           <a:p>
             <a:fld id="{CF393003-861C-4DE7-AEF1-5167E1C95917}" type="datetime1">
               <a:rPr lang="en-US" smtClean="0"/>
-              <a:t>12/28/2018</a:t>
+              <a:t>2/27/2020</a:t>
             </a:fld>
             <a:endParaRPr lang="en-US" dirty="0"/>
           </a:p>
@@ -3995,18 +3972,13 @@
           <a:lstStyle/>
           <a:p>
             <a:r>
-              <a:rPr lang="en-US" sz="4800" dirty="0" smtClean="0">
+              <a:rPr lang="en-US" sz="4800" dirty="0">
                 <a:solidFill>
                   <a:schemeClr val="bg1"/>
                 </a:solidFill>
               </a:rPr>
               <a:t>Google 2.0</a:t>
             </a:r>
-            <a:endParaRPr lang="en-US" sz="4800" dirty="0">
-              <a:solidFill>
-                <a:schemeClr val="bg1"/>
-              </a:solidFill>
-            </a:endParaRPr>
           </a:p>
         </p:txBody>
       </p:sp>
@@ -4056,10 +4028,9 @@
           <a:lstStyle/>
           <a:p>
             <a:r>
-              <a:rPr lang="en-US" dirty="0" smtClean="0"/>
-              <a:t>Forward Indexing</a:t>
-            </a:r>
-            <a:endParaRPr lang="en-US" dirty="0"/>
+              <a:rPr lang="en-US" dirty="0"/>
+              <a:t>Reverse/Inverted Indexing</a:t>
+            </a:r>
           </a:p>
         </p:txBody>
       </p:sp>
@@ -4084,19 +4055,7 @@
             </a:pPr>
             <a:r>
               <a:rPr lang="en-GB" b="1" dirty="0"/>
-              <a:t>D</a:t>
-            </a:r>
-            <a:r>
-              <a:rPr lang="en-GB" b="1" dirty="0" smtClean="0"/>
-              <a:t>ata </a:t>
-            </a:r>
-            <a:r>
-              <a:rPr lang="en-GB" b="1" dirty="0"/>
-              <a:t>structure that stores mapping from documents to </a:t>
-            </a:r>
-            <a:r>
-              <a:rPr lang="en-GB" b="1" dirty="0" smtClean="0"/>
-              <a:t>words.</a:t>
+              <a:t>Data structure that stores mapping from words to documents or set of documents and prioritize the documents according to some Page Rank.</a:t>
             </a:r>
           </a:p>
           <a:p>
@@ -4127,183 +4086,6 @@
               <a:rPr lang="en-US" smtClean="0"/>
               <a:pPr/>
               <a:t>10</a:t>
-            </a:fld>
-            <a:endParaRPr lang="en-US" dirty="0"/>
-          </a:p>
-        </p:txBody>
-      </p:sp>
-      <p:pic>
-        <p:nvPicPr>
-          <p:cNvPr id="5" name="Picture 4"/>
-          <p:cNvPicPr>
-            <a:picLocks noChangeAspect="1"/>
-          </p:cNvPicPr>
-          <p:nvPr/>
-        </p:nvPicPr>
-        <p:blipFill rotWithShape="1">
-          <a:blip r:embed="rId2"/>
-          <a:srcRect l="5627"/>
-          <a:stretch/>
-        </p:blipFill>
-        <p:spPr>
-          <a:xfrm>
-            <a:off x="1463039" y="2215585"/>
-            <a:ext cx="10472218" cy="1323975"/>
-          </a:xfrm>
-          <a:prstGeom prst="rect">
-            <a:avLst/>
-          </a:prstGeom>
-        </p:spPr>
-      </p:pic>
-      <p:pic>
-        <p:nvPicPr>
-          <p:cNvPr id="7" name="Picture 6"/>
-          <p:cNvPicPr>
-            <a:picLocks noChangeAspect="1"/>
-          </p:cNvPicPr>
-          <p:nvPr/>
-        </p:nvPicPr>
-        <p:blipFill>
-          <a:blip r:embed="rId3"/>
-          <a:stretch>
-            <a:fillRect/>
-          </a:stretch>
-        </p:blipFill>
-        <p:spPr>
-          <a:xfrm>
-            <a:off x="2124347" y="4022000"/>
-            <a:ext cx="5905500" cy="2419350"/>
-          </a:xfrm>
-          <a:prstGeom prst="rect">
-            <a:avLst/>
-          </a:prstGeom>
-        </p:spPr>
-      </p:pic>
-    </p:spTree>
-    <p:extLst>
-      <p:ext uri="{BB962C8B-B14F-4D97-AF65-F5344CB8AC3E}">
-        <p14:creationId xmlns:p14="http://schemas.microsoft.com/office/powerpoint/2010/main" val="1266197700"/>
-      </p:ext>
-    </p:extLst>
-  </p:cSld>
-  <p:clrMapOvr>
-    <a:masterClrMapping/>
-  </p:clrMapOvr>
-</p:sld>
-</file>
-
-<file path=ppt/slides/slide11.xml><?xml version="1.0" encoding="utf-8"?>
-<p:sld xmlns:a="http://schemas.openxmlformats.org/drawingml/2006/main" xmlns:r="http://schemas.openxmlformats.org/officeDocument/2006/relationships" xmlns:p="http://schemas.openxmlformats.org/presentationml/2006/main">
-  <p:cSld>
-    <p:spTree>
-      <p:nvGrpSpPr>
-        <p:cNvPr id="1" name=""/>
-        <p:cNvGrpSpPr/>
-        <p:nvPr/>
-      </p:nvGrpSpPr>
-      <p:grpSpPr>
-        <a:xfrm>
-          <a:off x="0" y="0"/>
-          <a:ext cx="0" cy="0"/>
-          <a:chOff x="0" y="0"/>
-          <a:chExt cx="0" cy="0"/>
-        </a:xfrm>
-      </p:grpSpPr>
-      <p:sp>
-        <p:nvSpPr>
-          <p:cNvPr id="2" name="Title 1"/>
-          <p:cNvSpPr>
-            <a:spLocks noGrp="1"/>
-          </p:cNvSpPr>
-          <p:nvPr>
-            <p:ph type="title"/>
-          </p:nvPr>
-        </p:nvSpPr>
-        <p:spPr/>
-        <p:txBody>
-          <a:bodyPr/>
-          <a:lstStyle/>
-          <a:p>
-            <a:r>
-              <a:rPr lang="en-US" dirty="0" smtClean="0"/>
-              <a:t>Reverse/Inverted Indexing</a:t>
-            </a:r>
-            <a:endParaRPr lang="en-US" dirty="0"/>
-          </a:p>
-        </p:txBody>
-      </p:sp>
-      <p:sp>
-        <p:nvSpPr>
-          <p:cNvPr id="3" name="Content Placeholder 2"/>
-          <p:cNvSpPr>
-            <a:spLocks noGrp="1"/>
-          </p:cNvSpPr>
-          <p:nvPr>
-            <p:ph sz="quarter" idx="13"/>
-          </p:nvPr>
-        </p:nvSpPr>
-        <p:spPr/>
-        <p:txBody>
-          <a:bodyPr/>
-          <a:lstStyle/>
-          <a:p>
-            <a:pPr marL="285750" indent="-285750">
-              <a:buFont typeface="Arial" panose="020B0604020202020204" pitchFamily="34" charset="0"/>
-              <a:buChar char="•"/>
-            </a:pPr>
-            <a:r>
-              <a:rPr lang="en-GB" b="1" dirty="0"/>
-              <a:t>D</a:t>
-            </a:r>
-            <a:r>
-              <a:rPr lang="en-GB" b="1" dirty="0" smtClean="0"/>
-              <a:t>ata </a:t>
-            </a:r>
-            <a:r>
-              <a:rPr lang="en-GB" b="1" dirty="0"/>
-              <a:t>structure that stores mapping from words </a:t>
-            </a:r>
-            <a:r>
-              <a:rPr lang="en-GB" b="1" dirty="0" smtClean="0"/>
-              <a:t>to </a:t>
-            </a:r>
-            <a:r>
-              <a:rPr lang="en-GB" b="1" dirty="0"/>
-              <a:t>documents or set of </a:t>
-            </a:r>
-            <a:r>
-              <a:rPr lang="en-GB" b="1" dirty="0" smtClean="0"/>
-              <a:t>documents and prioritize the documents according to some Page Rank.</a:t>
-            </a:r>
-          </a:p>
-          <a:p>
-            <a:pPr marL="285750" indent="-285750">
-              <a:buFont typeface="Arial" panose="020B0604020202020204" pitchFamily="34" charset="0"/>
-              <a:buChar char="•"/>
-            </a:pPr>
-            <a:endParaRPr lang="en-US" b="1" dirty="0"/>
-          </a:p>
-        </p:txBody>
-      </p:sp>
-      <p:sp>
-        <p:nvSpPr>
-          <p:cNvPr id="4" name="Slide Number Placeholder 3"/>
-          <p:cNvSpPr>
-            <a:spLocks noGrp="1"/>
-          </p:cNvSpPr>
-          <p:nvPr>
-            <p:ph type="sldNum" sz="quarter" idx="12"/>
-          </p:nvPr>
-        </p:nvSpPr>
-        <p:spPr/>
-        <p:txBody>
-          <a:bodyPr/>
-          <a:lstStyle/>
-          <a:p>
-            <a:fld id="{9860EDB8-5305-433F-BE41-D7A86D811DB3}" type="slidenum">
-              <a:rPr lang="en-US" smtClean="0"/>
-              <a:pPr/>
-              <a:t>11</a:t>
             </a:fld>
             <a:endParaRPr lang="en-US" dirty="0"/>
           </a:p>
@@ -4346,7 +4128,7 @@
 </p:sld>
 </file>
 
-<file path=ppt/slides/slide12.xml><?xml version="1.0" encoding="utf-8"?>
+<file path=ppt/slides/slide11.xml><?xml version="1.0" encoding="utf-8"?>
 <p:sld xmlns:a="http://schemas.openxmlformats.org/drawingml/2006/main" xmlns:r="http://schemas.openxmlformats.org/officeDocument/2006/relationships" xmlns:p="http://schemas.openxmlformats.org/presentationml/2006/main">
   <p:cSld>
     <p:spTree>
@@ -4379,10 +4161,9 @@
           <a:lstStyle/>
           <a:p>
             <a:r>
-              <a:rPr lang="en-US" dirty="0" smtClean="0"/>
+              <a:rPr lang="en-US" dirty="0"/>
               <a:t>Reverse/ Inverted Indexing</a:t>
             </a:r>
-            <a:endParaRPr lang="en-US" dirty="0"/>
           </a:p>
         </p:txBody>
       </p:sp>
@@ -4404,7 +4185,7 @@
             <a:fld id="{9860EDB8-5305-433F-BE41-D7A86D811DB3}" type="slidenum">
               <a:rPr lang="en-US" smtClean="0"/>
               <a:pPr/>
-              <a:t>12</a:t>
+              <a:t>11</a:t>
             </a:fld>
             <a:endParaRPr lang="en-US" dirty="0"/>
           </a:p>
@@ -4449,6 +4230,144 @@
 </p:sld>
 </file>
 
+<file path=ppt/slides/slide12.xml><?xml version="1.0" encoding="utf-8"?>
+<p:sld xmlns:a="http://schemas.openxmlformats.org/drawingml/2006/main" xmlns:r="http://schemas.openxmlformats.org/officeDocument/2006/relationships" xmlns:p="http://schemas.openxmlformats.org/presentationml/2006/main">
+  <p:cSld>
+    <p:spTree>
+      <p:nvGrpSpPr>
+        <p:cNvPr id="1" name=""/>
+        <p:cNvGrpSpPr/>
+        <p:nvPr/>
+      </p:nvGrpSpPr>
+      <p:grpSpPr>
+        <a:xfrm>
+          <a:off x="0" y="0"/>
+          <a:ext cx="0" cy="0"/>
+          <a:chOff x="0" y="0"/>
+          <a:chExt cx="0" cy="0"/>
+        </a:xfrm>
+      </p:grpSpPr>
+      <p:sp>
+        <p:nvSpPr>
+          <p:cNvPr id="2" name="Title 1"/>
+          <p:cNvSpPr>
+            <a:spLocks noGrp="1"/>
+          </p:cNvSpPr>
+          <p:nvPr>
+            <p:ph type="title"/>
+          </p:nvPr>
+        </p:nvSpPr>
+        <p:spPr/>
+        <p:txBody>
+          <a:bodyPr/>
+          <a:lstStyle/>
+          <a:p>
+            <a:r>
+              <a:rPr lang="en-US" dirty="0"/>
+              <a:t>Page Ranking Criteria:</a:t>
+            </a:r>
+          </a:p>
+        </p:txBody>
+      </p:sp>
+      <p:sp>
+        <p:nvSpPr>
+          <p:cNvPr id="3" name="Content Placeholder 2"/>
+          <p:cNvSpPr>
+            <a:spLocks noGrp="1"/>
+          </p:cNvSpPr>
+          <p:nvPr>
+            <p:ph sz="quarter" idx="13"/>
+          </p:nvPr>
+        </p:nvSpPr>
+        <p:spPr/>
+        <p:txBody>
+          <a:bodyPr/>
+          <a:lstStyle/>
+          <a:p>
+            <a:r>
+              <a:rPr lang="en-US" dirty="0"/>
+              <a:t>The documents containing a word are scored on the following criteria:</a:t>
+            </a:r>
+          </a:p>
+          <a:p>
+            <a:pPr marL="285750" indent="-285750">
+              <a:buFont typeface="Arial" panose="020B0604020202020204" pitchFamily="34" charset="0"/>
+              <a:buChar char="•"/>
+            </a:pPr>
+            <a:r>
+              <a:rPr lang="en-US" dirty="0"/>
+              <a:t>Title has 100 points</a:t>
+            </a:r>
+          </a:p>
+          <a:p>
+            <a:pPr marL="285750" indent="-285750">
+              <a:buFont typeface="Arial" panose="020B0604020202020204" pitchFamily="34" charset="0"/>
+              <a:buChar char="•"/>
+            </a:pPr>
+            <a:r>
+              <a:rPr lang="en-US" dirty="0"/>
+              <a:t>Headings have 3 points</a:t>
+            </a:r>
+          </a:p>
+          <a:p>
+            <a:pPr marL="285750" indent="-285750">
+              <a:buFont typeface="Arial" panose="020B0604020202020204" pitchFamily="34" charset="0"/>
+              <a:buChar char="•"/>
+            </a:pPr>
+            <a:r>
+              <a:rPr lang="en-US" dirty="0"/>
+              <a:t>Bold/Italic words have 2 points</a:t>
+            </a:r>
+          </a:p>
+          <a:p>
+            <a:pPr marL="285750" indent="-285750">
+              <a:buFont typeface="Arial" panose="020B0604020202020204" pitchFamily="34" charset="0"/>
+              <a:buChar char="•"/>
+            </a:pPr>
+            <a:r>
+              <a:rPr lang="en-US" dirty="0"/>
+              <a:t>Simple words have 1 point.</a:t>
+            </a:r>
+          </a:p>
+        </p:txBody>
+      </p:sp>
+      <p:sp>
+        <p:nvSpPr>
+          <p:cNvPr id="4" name="Slide Number Placeholder 3"/>
+          <p:cNvSpPr>
+            <a:spLocks noGrp="1"/>
+          </p:cNvSpPr>
+          <p:nvPr>
+            <p:ph type="sldNum" sz="quarter" idx="12"/>
+          </p:nvPr>
+        </p:nvSpPr>
+        <p:spPr/>
+        <p:txBody>
+          <a:bodyPr/>
+          <a:lstStyle/>
+          <a:p>
+            <a:fld id="{9860EDB8-5305-433F-BE41-D7A86D811DB3}" type="slidenum">
+              <a:rPr lang="en-US" smtClean="0"/>
+              <a:pPr/>
+              <a:t>12</a:t>
+            </a:fld>
+            <a:endParaRPr lang="en-US" dirty="0"/>
+          </a:p>
+        </p:txBody>
+      </p:sp>
+    </p:spTree>
+    <p:extLst>
+      <p:ext uri="{BB962C8B-B14F-4D97-AF65-F5344CB8AC3E}">
+        <p14:creationId xmlns:p14="http://schemas.microsoft.com/office/powerpoint/2010/main" val="3111088835"/>
+      </p:ext>
+    </p:extLst>
+  </p:cSld>
+  <p:clrMapOvr>
+    <a:masterClrMapping/>
+  </p:clrMapOvr>
+</p:sld>
+</file>
+
 <file path=ppt/slides/slide13.xml><?xml version="1.0" encoding="utf-8"?>
 <p:sld xmlns:a="http://schemas.openxmlformats.org/drawingml/2006/main" xmlns:r="http://schemas.openxmlformats.org/officeDocument/2006/relationships" xmlns:p="http://schemas.openxmlformats.org/presentationml/2006/main">
   <p:cSld>
@@ -4478,76 +4397,40 @@
         </p:nvSpPr>
         <p:spPr/>
         <p:txBody>
-          <a:bodyPr/>
-          <a:lstStyle/>
-          <a:p>
-            <a:r>
-              <a:rPr lang="en-US" dirty="0" smtClean="0"/>
-              <a:t>Page Ranking Criteria:</a:t>
-            </a:r>
+          <a:bodyPr>
+            <a:normAutofit/>
+          </a:bodyPr>
+          <a:lstStyle/>
+          <a:p>
+            <a:r>
+              <a:rPr lang="en-US" dirty="0"/>
+              <a:t>Linear Time Consumption</a:t>
+            </a:r>
+          </a:p>
+        </p:txBody>
+      </p:sp>
+      <p:sp>
+        <p:nvSpPr>
+          <p:cNvPr id="3" name="Content Placeholder 2"/>
+          <p:cNvSpPr>
+            <a:spLocks noGrp="1"/>
+          </p:cNvSpPr>
+          <p:nvPr>
+            <p:ph sz="quarter" idx="13"/>
+          </p:nvPr>
+        </p:nvSpPr>
+        <p:spPr/>
+        <p:txBody>
+          <a:bodyPr/>
+          <a:lstStyle/>
+          <a:p>
+            <a:r>
+              <a:rPr lang="en-US" sz="1800" dirty="0"/>
+              <a:t>Time consumption graph for reverse indexing:</a:t>
+            </a:r>
+          </a:p>
+          <a:p>
             <a:endParaRPr lang="en-US" dirty="0"/>
-          </a:p>
-        </p:txBody>
-      </p:sp>
-      <p:sp>
-        <p:nvSpPr>
-          <p:cNvPr id="3" name="Content Placeholder 2"/>
-          <p:cNvSpPr>
-            <a:spLocks noGrp="1"/>
-          </p:cNvSpPr>
-          <p:nvPr>
-            <p:ph sz="quarter" idx="13"/>
-          </p:nvPr>
-        </p:nvSpPr>
-        <p:spPr/>
-        <p:txBody>
-          <a:bodyPr/>
-          <a:lstStyle/>
-          <a:p>
-            <a:r>
-              <a:rPr lang="en-US" dirty="0" smtClean="0"/>
-              <a:t>The documents containing a word are scored on the following criteria:</a:t>
-            </a:r>
-          </a:p>
-          <a:p>
-            <a:pPr marL="285750" indent="-285750">
-              <a:buFont typeface="Arial" panose="020B0604020202020204" pitchFamily="34" charset="0"/>
-              <a:buChar char="•"/>
-            </a:pPr>
-            <a:r>
-              <a:rPr lang="en-US" dirty="0" smtClean="0"/>
-              <a:t>Title has 100 points</a:t>
-            </a:r>
-          </a:p>
-          <a:p>
-            <a:pPr marL="285750" indent="-285750">
-              <a:buFont typeface="Arial" panose="020B0604020202020204" pitchFamily="34" charset="0"/>
-              <a:buChar char="•"/>
-            </a:pPr>
-            <a:r>
-              <a:rPr lang="en-US" dirty="0" smtClean="0"/>
-              <a:t>Headings have 3 points</a:t>
-            </a:r>
-          </a:p>
-          <a:p>
-            <a:pPr marL="285750" indent="-285750">
-              <a:buFont typeface="Arial" panose="020B0604020202020204" pitchFamily="34" charset="0"/>
-              <a:buChar char="•"/>
-            </a:pPr>
-            <a:r>
-              <a:rPr lang="en-US" dirty="0" smtClean="0"/>
-              <a:t>Bold/Italic words have 2 points</a:t>
-            </a:r>
-          </a:p>
-          <a:p>
-            <a:pPr marL="285750" indent="-285750">
-              <a:buFont typeface="Arial" panose="020B0604020202020204" pitchFamily="34" charset="0"/>
-              <a:buChar char="•"/>
-            </a:pPr>
-            <a:r>
-              <a:rPr lang="en-US" dirty="0" smtClean="0"/>
-              <a:t>Simple words have 1 point.</a:t>
-            </a:r>
           </a:p>
         </p:txBody>
       </p:sp>
@@ -4570,110 +4453,6 @@
               <a:rPr lang="en-US" smtClean="0"/>
               <a:pPr/>
               <a:t>13</a:t>
-            </a:fld>
-            <a:endParaRPr lang="en-US" dirty="0"/>
-          </a:p>
-        </p:txBody>
-      </p:sp>
-    </p:spTree>
-    <p:extLst>
-      <p:ext uri="{BB962C8B-B14F-4D97-AF65-F5344CB8AC3E}">
-        <p14:creationId xmlns:p14="http://schemas.microsoft.com/office/powerpoint/2010/main" val="3111088835"/>
-      </p:ext>
-    </p:extLst>
-  </p:cSld>
-  <p:clrMapOvr>
-    <a:masterClrMapping/>
-  </p:clrMapOvr>
-</p:sld>
-</file>
-
-<file path=ppt/slides/slide14.xml><?xml version="1.0" encoding="utf-8"?>
-<p:sld xmlns:a="http://schemas.openxmlformats.org/drawingml/2006/main" xmlns:r="http://schemas.openxmlformats.org/officeDocument/2006/relationships" xmlns:p="http://schemas.openxmlformats.org/presentationml/2006/main">
-  <p:cSld>
-    <p:spTree>
-      <p:nvGrpSpPr>
-        <p:cNvPr id="1" name=""/>
-        <p:cNvGrpSpPr/>
-        <p:nvPr/>
-      </p:nvGrpSpPr>
-      <p:grpSpPr>
-        <a:xfrm>
-          <a:off x="0" y="0"/>
-          <a:ext cx="0" cy="0"/>
-          <a:chOff x="0" y="0"/>
-          <a:chExt cx="0" cy="0"/>
-        </a:xfrm>
-      </p:grpSpPr>
-      <p:sp>
-        <p:nvSpPr>
-          <p:cNvPr id="2" name="Title 1"/>
-          <p:cNvSpPr>
-            <a:spLocks noGrp="1"/>
-          </p:cNvSpPr>
-          <p:nvPr>
-            <p:ph type="title"/>
-          </p:nvPr>
-        </p:nvSpPr>
-        <p:spPr/>
-        <p:txBody>
-          <a:bodyPr>
-            <a:normAutofit/>
-          </a:bodyPr>
-          <a:lstStyle/>
-          <a:p>
-            <a:r>
-              <a:rPr lang="en-US" dirty="0" smtClean="0"/>
-              <a:t>Linear Time Consumption</a:t>
-            </a:r>
-            <a:endParaRPr lang="en-US" dirty="0"/>
-          </a:p>
-        </p:txBody>
-      </p:sp>
-      <p:sp>
-        <p:nvSpPr>
-          <p:cNvPr id="3" name="Content Placeholder 2"/>
-          <p:cNvSpPr>
-            <a:spLocks noGrp="1"/>
-          </p:cNvSpPr>
-          <p:nvPr>
-            <p:ph sz="quarter" idx="13"/>
-          </p:nvPr>
-        </p:nvSpPr>
-        <p:spPr/>
-        <p:txBody>
-          <a:bodyPr/>
-          <a:lstStyle/>
-          <a:p>
-            <a:r>
-              <a:rPr lang="en-US" sz="1800" dirty="0" smtClean="0"/>
-              <a:t>Time consumption graph for reverse indexing:</a:t>
-            </a:r>
-          </a:p>
-          <a:p>
-            <a:endParaRPr lang="en-US" dirty="0"/>
-          </a:p>
-        </p:txBody>
-      </p:sp>
-      <p:sp>
-        <p:nvSpPr>
-          <p:cNvPr id="4" name="Slide Number Placeholder 3"/>
-          <p:cNvSpPr>
-            <a:spLocks noGrp="1"/>
-          </p:cNvSpPr>
-          <p:nvPr>
-            <p:ph type="sldNum" sz="quarter" idx="12"/>
-          </p:nvPr>
-        </p:nvSpPr>
-        <p:spPr/>
-        <p:txBody>
-          <a:bodyPr/>
-          <a:lstStyle/>
-          <a:p>
-            <a:fld id="{9860EDB8-5305-433F-BE41-D7A86D811DB3}" type="slidenum">
-              <a:rPr lang="en-US" smtClean="0"/>
-              <a:pPr/>
-              <a:t>14</a:t>
             </a:fld>
             <a:endParaRPr lang="en-US" dirty="0"/>
           </a:p>
@@ -4722,6 +4501,108 @@
 </p:sld>
 </file>
 
+<file path=ppt/slides/slide14.xml><?xml version="1.0" encoding="utf-8"?>
+<p:sld xmlns:a="http://schemas.openxmlformats.org/drawingml/2006/main" xmlns:r="http://schemas.openxmlformats.org/officeDocument/2006/relationships" xmlns:p="http://schemas.openxmlformats.org/presentationml/2006/main">
+  <p:cSld>
+    <p:spTree>
+      <p:nvGrpSpPr>
+        <p:cNvPr id="1" name=""/>
+        <p:cNvGrpSpPr/>
+        <p:nvPr/>
+      </p:nvGrpSpPr>
+      <p:grpSpPr>
+        <a:xfrm>
+          <a:off x="0" y="0"/>
+          <a:ext cx="0" cy="0"/>
+          <a:chOff x="0" y="0"/>
+          <a:chExt cx="0" cy="0"/>
+        </a:xfrm>
+      </p:grpSpPr>
+      <p:sp>
+        <p:nvSpPr>
+          <p:cNvPr id="2" name="Title 1"/>
+          <p:cNvSpPr>
+            <a:spLocks noGrp="1"/>
+          </p:cNvSpPr>
+          <p:nvPr>
+            <p:ph type="title"/>
+          </p:nvPr>
+        </p:nvSpPr>
+        <p:spPr/>
+        <p:txBody>
+          <a:bodyPr/>
+          <a:lstStyle/>
+          <a:p>
+            <a:r>
+              <a:rPr lang="en-US" dirty="0"/>
+              <a:t>Single Word Searching</a:t>
+            </a:r>
+          </a:p>
+        </p:txBody>
+      </p:sp>
+      <p:pic>
+        <p:nvPicPr>
+          <p:cNvPr id="5" name="Content Placeholder 4"/>
+          <p:cNvPicPr>
+            <a:picLocks noGrp="1" noChangeAspect="1"/>
+          </p:cNvPicPr>
+          <p:nvPr>
+            <p:ph sz="quarter" idx="13"/>
+          </p:nvPr>
+        </p:nvPicPr>
+        <p:blipFill>
+          <a:blip r:embed="rId2"/>
+          <a:stretch>
+            <a:fillRect/>
+          </a:stretch>
+        </p:blipFill>
+        <p:spPr>
+          <a:xfrm>
+            <a:off x="1571732" y="2061556"/>
+            <a:ext cx="9880695" cy="3611635"/>
+          </a:xfrm>
+          <a:prstGeom prst="rect">
+            <a:avLst/>
+          </a:prstGeom>
+        </p:spPr>
+      </p:pic>
+      <p:sp>
+        <p:nvSpPr>
+          <p:cNvPr id="4" name="Slide Number Placeholder 3"/>
+          <p:cNvSpPr>
+            <a:spLocks noGrp="1"/>
+          </p:cNvSpPr>
+          <p:nvPr>
+            <p:ph type="sldNum" sz="quarter" idx="12"/>
+          </p:nvPr>
+        </p:nvSpPr>
+        <p:spPr/>
+        <p:txBody>
+          <a:bodyPr/>
+          <a:lstStyle/>
+          <a:p>
+            <a:fld id="{9860EDB8-5305-433F-BE41-D7A86D811DB3}" type="slidenum">
+              <a:rPr lang="en-US" smtClean="0"/>
+              <a:pPr/>
+              <a:t>14</a:t>
+            </a:fld>
+            <a:endParaRPr lang="en-US" dirty="0"/>
+          </a:p>
+        </p:txBody>
+      </p:sp>
+    </p:spTree>
+    <p:extLst>
+      <p:ext uri="{BB962C8B-B14F-4D97-AF65-F5344CB8AC3E}">
+        <p14:creationId xmlns:p14="http://schemas.microsoft.com/office/powerpoint/2010/main" val="816103369"/>
+      </p:ext>
+    </p:extLst>
+  </p:cSld>
+  <p:clrMapOvr>
+    <a:masterClrMapping/>
+  </p:clrMapOvr>
+</p:sld>
+</file>
+
 <file path=ppt/slides/slide15.xml><?xml version="1.0" encoding="utf-8"?>
 <p:sld xmlns:a="http://schemas.openxmlformats.org/drawingml/2006/main" xmlns:r="http://schemas.openxmlformats.org/officeDocument/2006/relationships" xmlns:p="http://schemas.openxmlformats.org/presentationml/2006/main">
   <p:cSld>
@@ -4755,10 +4636,9 @@
           <a:lstStyle/>
           <a:p>
             <a:r>
-              <a:rPr lang="en-US" dirty="0" smtClean="0"/>
-              <a:t>Single Word Searching</a:t>
-            </a:r>
-            <a:endParaRPr lang="en-US" dirty="0"/>
+              <a:rPr lang="en-US" dirty="0"/>
+              <a:t>Multiple Words Searching</a:t>
+            </a:r>
           </a:p>
         </p:txBody>
       </p:sp>
@@ -4780,8 +4660,8 @@
         </p:blipFill>
         <p:spPr>
           <a:xfrm>
-            <a:off x="1571732" y="2061556"/>
-            <a:ext cx="9880695" cy="3611635"/>
+            <a:off x="2543695" y="1222726"/>
+            <a:ext cx="7942033" cy="5316188"/>
           </a:xfrm>
           <a:prstGeom prst="rect">
             <a:avLst/>
@@ -4815,7 +4695,7 @@
     </p:spTree>
     <p:extLst>
       <p:ext uri="{BB962C8B-B14F-4D97-AF65-F5344CB8AC3E}">
-        <p14:creationId xmlns:p14="http://schemas.microsoft.com/office/powerpoint/2010/main" val="816103369"/>
+        <p14:creationId xmlns:p14="http://schemas.microsoft.com/office/powerpoint/2010/main" val="292525294"/>
       </p:ext>
     </p:extLst>
   </p:cSld>
@@ -4858,39 +4738,12 @@
           <a:lstStyle/>
           <a:p>
             <a:r>
-              <a:rPr lang="en-US" dirty="0" smtClean="0"/>
-              <a:t>Multiple Words Searching</a:t>
-            </a:r>
-            <a:endParaRPr lang="en-US" dirty="0"/>
-          </a:p>
-        </p:txBody>
-      </p:sp>
-      <p:pic>
-        <p:nvPicPr>
-          <p:cNvPr id="5" name="Content Placeholder 4"/>
-          <p:cNvPicPr>
-            <a:picLocks noGrp="1" noChangeAspect="1"/>
-          </p:cNvPicPr>
-          <p:nvPr>
-            <p:ph sz="quarter" idx="13"/>
-          </p:nvPr>
-        </p:nvPicPr>
-        <p:blipFill>
-          <a:blip r:embed="rId2"/>
-          <a:stretch>
-            <a:fillRect/>
-          </a:stretch>
-        </p:blipFill>
-        <p:spPr>
-          <a:xfrm>
-            <a:off x="2543695" y="1222726"/>
-            <a:ext cx="7942033" cy="5316188"/>
-          </a:xfrm>
-          <a:prstGeom prst="rect">
-            <a:avLst/>
-          </a:prstGeom>
-        </p:spPr>
-      </p:pic>
+              <a:rPr lang="en-US" dirty="0"/>
+              <a:t>Graphical User Interface</a:t>
+            </a:r>
+          </a:p>
+        </p:txBody>
+      </p:sp>
       <p:sp>
         <p:nvSpPr>
           <p:cNvPr id="4" name="Slide Number Placeholder 3"/>
@@ -4910,83 +4763,6 @@
               <a:rPr lang="en-US" smtClean="0"/>
               <a:pPr/>
               <a:t>16</a:t>
-            </a:fld>
-            <a:endParaRPr lang="en-US" dirty="0"/>
-          </a:p>
-        </p:txBody>
-      </p:sp>
-    </p:spTree>
-    <p:extLst>
-      <p:ext uri="{BB962C8B-B14F-4D97-AF65-F5344CB8AC3E}">
-        <p14:creationId xmlns:p14="http://schemas.microsoft.com/office/powerpoint/2010/main" val="292525294"/>
-      </p:ext>
-    </p:extLst>
-  </p:cSld>
-  <p:clrMapOvr>
-    <a:masterClrMapping/>
-  </p:clrMapOvr>
-</p:sld>
-</file>
-
-<file path=ppt/slides/slide17.xml><?xml version="1.0" encoding="utf-8"?>
-<p:sld xmlns:a="http://schemas.openxmlformats.org/drawingml/2006/main" xmlns:r="http://schemas.openxmlformats.org/officeDocument/2006/relationships" xmlns:p="http://schemas.openxmlformats.org/presentationml/2006/main">
-  <p:cSld>
-    <p:spTree>
-      <p:nvGrpSpPr>
-        <p:cNvPr id="1" name=""/>
-        <p:cNvGrpSpPr/>
-        <p:nvPr/>
-      </p:nvGrpSpPr>
-      <p:grpSpPr>
-        <a:xfrm>
-          <a:off x="0" y="0"/>
-          <a:ext cx="0" cy="0"/>
-          <a:chOff x="0" y="0"/>
-          <a:chExt cx="0" cy="0"/>
-        </a:xfrm>
-      </p:grpSpPr>
-      <p:sp>
-        <p:nvSpPr>
-          <p:cNvPr id="2" name="Title 1"/>
-          <p:cNvSpPr>
-            <a:spLocks noGrp="1"/>
-          </p:cNvSpPr>
-          <p:nvPr>
-            <p:ph type="title"/>
-          </p:nvPr>
-        </p:nvSpPr>
-        <p:spPr/>
-        <p:txBody>
-          <a:bodyPr/>
-          <a:lstStyle/>
-          <a:p>
-            <a:r>
-              <a:rPr lang="en-US" dirty="0" smtClean="0"/>
-              <a:t>Graphical User Interface</a:t>
-            </a:r>
-            <a:endParaRPr lang="en-US" dirty="0"/>
-          </a:p>
-        </p:txBody>
-      </p:sp>
-      <p:sp>
-        <p:nvSpPr>
-          <p:cNvPr id="4" name="Slide Number Placeholder 3"/>
-          <p:cNvSpPr>
-            <a:spLocks noGrp="1"/>
-          </p:cNvSpPr>
-          <p:nvPr>
-            <p:ph type="sldNum" sz="quarter" idx="12"/>
-          </p:nvPr>
-        </p:nvSpPr>
-        <p:spPr/>
-        <p:txBody>
-          <a:bodyPr/>
-          <a:lstStyle/>
-          <a:p>
-            <a:fld id="{9860EDB8-5305-433F-BE41-D7A86D811DB3}" type="slidenum">
-              <a:rPr lang="en-US" smtClean="0"/>
-              <a:pPr/>
-              <a:t>17</a:t>
             </a:fld>
             <a:endParaRPr lang="en-US" dirty="0"/>
           </a:p>
@@ -5029,6 +4805,108 @@
 </p:sld>
 </file>
 
+<file path=ppt/slides/slide17.xml><?xml version="1.0" encoding="utf-8"?>
+<p:sld xmlns:a="http://schemas.openxmlformats.org/drawingml/2006/main" xmlns:r="http://schemas.openxmlformats.org/officeDocument/2006/relationships" xmlns:p="http://schemas.openxmlformats.org/presentationml/2006/main">
+  <p:cSld>
+    <p:spTree>
+      <p:nvGrpSpPr>
+        <p:cNvPr id="1" name=""/>
+        <p:cNvGrpSpPr/>
+        <p:nvPr/>
+      </p:nvGrpSpPr>
+      <p:grpSpPr>
+        <a:xfrm>
+          <a:off x="0" y="0"/>
+          <a:ext cx="0" cy="0"/>
+          <a:chOff x="0" y="0"/>
+          <a:chExt cx="0" cy="0"/>
+        </a:xfrm>
+      </p:grpSpPr>
+      <p:sp>
+        <p:nvSpPr>
+          <p:cNvPr id="2" name="Title 1"/>
+          <p:cNvSpPr>
+            <a:spLocks noGrp="1"/>
+          </p:cNvSpPr>
+          <p:nvPr>
+            <p:ph type="title"/>
+          </p:nvPr>
+        </p:nvSpPr>
+        <p:spPr/>
+        <p:txBody>
+          <a:bodyPr/>
+          <a:lstStyle/>
+          <a:p>
+            <a:r>
+              <a:rPr lang="en-US" dirty="0"/>
+              <a:t>Commit History on BitBucket.org</a:t>
+            </a:r>
+          </a:p>
+        </p:txBody>
+      </p:sp>
+      <p:pic>
+        <p:nvPicPr>
+          <p:cNvPr id="5" name="Content Placeholder 4"/>
+          <p:cNvPicPr>
+            <a:picLocks noGrp="1" noChangeAspect="1"/>
+          </p:cNvPicPr>
+          <p:nvPr>
+            <p:ph sz="quarter" idx="13"/>
+          </p:nvPr>
+        </p:nvPicPr>
+        <p:blipFill>
+          <a:blip r:embed="rId2"/>
+          <a:stretch>
+            <a:fillRect/>
+          </a:stretch>
+        </p:blipFill>
+        <p:spPr>
+          <a:xfrm>
+            <a:off x="2152996" y="1427254"/>
+            <a:ext cx="8391201" cy="4929098"/>
+          </a:xfrm>
+          <a:prstGeom prst="rect">
+            <a:avLst/>
+          </a:prstGeom>
+        </p:spPr>
+      </p:pic>
+      <p:sp>
+        <p:nvSpPr>
+          <p:cNvPr id="4" name="Slide Number Placeholder 3"/>
+          <p:cNvSpPr>
+            <a:spLocks noGrp="1"/>
+          </p:cNvSpPr>
+          <p:nvPr>
+            <p:ph type="sldNum" sz="quarter" idx="12"/>
+          </p:nvPr>
+        </p:nvSpPr>
+        <p:spPr/>
+        <p:txBody>
+          <a:bodyPr/>
+          <a:lstStyle/>
+          <a:p>
+            <a:fld id="{9860EDB8-5305-433F-BE41-D7A86D811DB3}" type="slidenum">
+              <a:rPr lang="en-US" smtClean="0"/>
+              <a:pPr/>
+              <a:t>17</a:t>
+            </a:fld>
+            <a:endParaRPr lang="en-US" dirty="0"/>
+          </a:p>
+        </p:txBody>
+      </p:sp>
+    </p:spTree>
+    <p:extLst>
+      <p:ext uri="{BB962C8B-B14F-4D97-AF65-F5344CB8AC3E}">
+        <p14:creationId xmlns:p14="http://schemas.microsoft.com/office/powerpoint/2010/main" val="1101743206"/>
+      </p:ext>
+    </p:extLst>
+  </p:cSld>
+  <p:clrMapOvr>
+    <a:masterClrMapping/>
+  </p:clrMapOvr>
+</p:sld>
+</file>
+
 <file path=ppt/slides/slide18.xml><?xml version="1.0" encoding="utf-8"?>
 <p:sld xmlns:a="http://schemas.openxmlformats.org/drawingml/2006/main" xmlns:r="http://schemas.openxmlformats.org/officeDocument/2006/relationships" xmlns:p="http://schemas.openxmlformats.org/presentationml/2006/main">
   <p:cSld>
@@ -5048,55 +4926,6 @@
       </p:grpSpPr>
       <p:sp>
         <p:nvSpPr>
-          <p:cNvPr id="2" name="Title 1"/>
-          <p:cNvSpPr>
-            <a:spLocks noGrp="1"/>
-          </p:cNvSpPr>
-          <p:nvPr>
-            <p:ph type="title"/>
-          </p:nvPr>
-        </p:nvSpPr>
-        <p:spPr/>
-        <p:txBody>
-          <a:bodyPr/>
-          <a:lstStyle/>
-          <a:p>
-            <a:r>
-              <a:rPr lang="en-US" dirty="0" smtClean="0"/>
-              <a:t>Commit History on BitBucket.org</a:t>
-            </a:r>
-            <a:endParaRPr lang="en-US" dirty="0"/>
-          </a:p>
-        </p:txBody>
-      </p:sp>
-      <p:pic>
-        <p:nvPicPr>
-          <p:cNvPr id="5" name="Content Placeholder 4"/>
-          <p:cNvPicPr>
-            <a:picLocks noGrp="1" noChangeAspect="1"/>
-          </p:cNvPicPr>
-          <p:nvPr>
-            <p:ph sz="quarter" idx="13"/>
-          </p:nvPr>
-        </p:nvPicPr>
-        <p:blipFill>
-          <a:blip r:embed="rId2"/>
-          <a:stretch>
-            <a:fillRect/>
-          </a:stretch>
-        </p:blipFill>
-        <p:spPr>
-          <a:xfrm>
-            <a:off x="2152996" y="1427254"/>
-            <a:ext cx="8391201" cy="4929098"/>
-          </a:xfrm>
-          <a:prstGeom prst="rect">
-            <a:avLst/>
-          </a:prstGeom>
-        </p:spPr>
-      </p:pic>
-      <p:sp>
-        <p:nvSpPr>
           <p:cNvPr id="4" name="Slide Number Placeholder 3"/>
           <p:cNvSpPr>
             <a:spLocks noGrp="1"/>
@@ -5114,60 +4943,6 @@
               <a:rPr lang="en-US" smtClean="0"/>
               <a:pPr/>
               <a:t>18</a:t>
-            </a:fld>
-            <a:endParaRPr lang="en-US" dirty="0"/>
-          </a:p>
-        </p:txBody>
-      </p:sp>
-    </p:spTree>
-    <p:extLst>
-      <p:ext uri="{BB962C8B-B14F-4D97-AF65-F5344CB8AC3E}">
-        <p14:creationId xmlns:p14="http://schemas.microsoft.com/office/powerpoint/2010/main" val="1101743206"/>
-      </p:ext>
-    </p:extLst>
-  </p:cSld>
-  <p:clrMapOvr>
-    <a:masterClrMapping/>
-  </p:clrMapOvr>
-</p:sld>
-</file>
-
-<file path=ppt/slides/slide19.xml><?xml version="1.0" encoding="utf-8"?>
-<p:sld xmlns:a="http://schemas.openxmlformats.org/drawingml/2006/main" xmlns:r="http://schemas.openxmlformats.org/officeDocument/2006/relationships" xmlns:p="http://schemas.openxmlformats.org/presentationml/2006/main">
-  <p:cSld>
-    <p:spTree>
-      <p:nvGrpSpPr>
-        <p:cNvPr id="1" name=""/>
-        <p:cNvGrpSpPr/>
-        <p:nvPr/>
-      </p:nvGrpSpPr>
-      <p:grpSpPr>
-        <a:xfrm>
-          <a:off x="0" y="0"/>
-          <a:ext cx="0" cy="0"/>
-          <a:chOff x="0" y="0"/>
-          <a:chExt cx="0" cy="0"/>
-        </a:xfrm>
-      </p:grpSpPr>
-      <p:sp>
-        <p:nvSpPr>
-          <p:cNvPr id="4" name="Slide Number Placeholder 3"/>
-          <p:cNvSpPr>
-            <a:spLocks noGrp="1"/>
-          </p:cNvSpPr>
-          <p:nvPr>
-            <p:ph type="sldNum" sz="quarter" idx="12"/>
-          </p:nvPr>
-        </p:nvSpPr>
-        <p:spPr/>
-        <p:txBody>
-          <a:bodyPr/>
-          <a:lstStyle/>
-          <a:p>
-            <a:fld id="{9860EDB8-5305-433F-BE41-D7A86D811DB3}" type="slidenum">
-              <a:rPr lang="en-US" smtClean="0"/>
-              <a:pPr/>
-              <a:t>19</a:t>
             </a:fld>
             <a:endParaRPr lang="en-US" dirty="0"/>
           </a:p>
@@ -5262,10 +5037,9 @@
           <a:lstStyle/>
           <a:p>
             <a:r>
-              <a:rPr lang="en-US" dirty="0" smtClean="0"/>
-              <a:t>Group Members</a:t>
-            </a:r>
-            <a:endParaRPr lang="en-US" dirty="0"/>
+              <a:rPr lang="en-US" dirty="0"/>
+              <a:t>Contents</a:t>
+            </a:r>
           </a:p>
         </p:txBody>
       </p:sp>
@@ -5279,9 +5053,16 @@
             <p:ph sz="quarter" idx="13"/>
           </p:nvPr>
         </p:nvSpPr>
-        <p:spPr/>
-        <p:txBody>
-          <a:bodyPr/>
+        <p:spPr>
+          <a:xfrm>
+            <a:off x="1752600" y="1444751"/>
+            <a:ext cx="10076688" cy="4806419"/>
+          </a:xfrm>
+        </p:spPr>
+        <p:txBody>
+          <a:bodyPr>
+            <a:normAutofit/>
+          </a:bodyPr>
           <a:lstStyle/>
           <a:p>
             <a:pPr marL="285750" indent="-285750">
@@ -5289,20 +5070,8 @@
               <a:buChar char="•"/>
             </a:pPr>
             <a:r>
-              <a:rPr lang="en-US" b="1" dirty="0" err="1" smtClean="0"/>
-              <a:t>Muneeb</a:t>
-            </a:r>
-            <a:r>
-              <a:rPr lang="en-US" b="1" dirty="0" smtClean="0"/>
-              <a:t> </a:t>
-            </a:r>
-            <a:r>
-              <a:rPr lang="en-US" b="1" dirty="0" err="1" smtClean="0"/>
-              <a:t>Aijaz</a:t>
-            </a:r>
-            <a:r>
-              <a:rPr lang="en-US" b="1" dirty="0" smtClean="0"/>
-              <a:t>	</a:t>
+              <a:rPr lang="en-US" dirty="0"/>
+              <a:t>Dataset</a:t>
             </a:r>
           </a:p>
           <a:p>
@@ -5311,22 +5080,9 @@
               <a:buChar char="•"/>
             </a:pPr>
             <a:r>
-              <a:rPr lang="en-US" b="1" dirty="0" smtClean="0"/>
-              <a:t>Sami </a:t>
-            </a:r>
-            <a:r>
-              <a:rPr lang="en-US" b="1" dirty="0" err="1" smtClean="0"/>
-              <a:t>Mansoor</a:t>
-            </a:r>
-            <a:r>
-              <a:rPr lang="en-US" b="1" dirty="0" smtClean="0"/>
-              <a:t> </a:t>
-            </a:r>
-            <a:r>
-              <a:rPr lang="en-US" b="1" dirty="0" err="1" smtClean="0"/>
-              <a:t>Alavi</a:t>
-            </a:r>
-            <a:endParaRPr lang="en-US" b="1" dirty="0" smtClean="0"/>
+              <a:rPr lang="en-US" dirty="0"/>
+              <a:t>Technologies Used</a:t>
+            </a:r>
           </a:p>
           <a:p>
             <a:pPr marL="285750" indent="-285750">
@@ -5334,14 +5090,9 @@
               <a:buChar char="•"/>
             </a:pPr>
             <a:r>
-              <a:rPr lang="en-US" b="1" dirty="0" smtClean="0"/>
-              <a:t>Mariam </a:t>
-            </a:r>
-            <a:r>
-              <a:rPr lang="en-US" b="1" dirty="0" err="1" smtClean="0"/>
-              <a:t>Naseem</a:t>
-            </a:r>
-            <a:endParaRPr lang="en-US" b="1" dirty="0" smtClean="0"/>
+              <a:rPr lang="en-US" dirty="0"/>
+              <a:t>Crawler</a:t>
+            </a:r>
           </a:p>
           <a:p>
             <a:pPr marL="285750" indent="-285750">
@@ -5349,10 +5100,96 @@
               <a:buChar char="•"/>
             </a:pPr>
             <a:r>
-              <a:rPr lang="en-US" b="1" dirty="0" smtClean="0"/>
-              <a:t>Mashhood Ijaz</a:t>
-            </a:r>
-            <a:endParaRPr lang="en-US" b="1" dirty="0"/>
+              <a:rPr lang="en-US" dirty="0"/>
+              <a:t>Parser</a:t>
+            </a:r>
+          </a:p>
+          <a:p>
+            <a:pPr marL="285750" indent="-285750">
+              <a:buFont typeface="Arial" panose="020B0604020202020204" pitchFamily="34" charset="0"/>
+              <a:buChar char="•"/>
+            </a:pPr>
+            <a:r>
+              <a:rPr lang="en-US" dirty="0"/>
+              <a:t>Forward vs Reverse Indexing</a:t>
+            </a:r>
+          </a:p>
+          <a:p>
+            <a:pPr marL="285750" indent="-285750">
+              <a:buFont typeface="Arial" panose="020B0604020202020204" pitchFamily="34" charset="0"/>
+              <a:buChar char="•"/>
+            </a:pPr>
+            <a:r>
+              <a:rPr lang="en-US" dirty="0"/>
+              <a:t>Forward Indexing</a:t>
+            </a:r>
+          </a:p>
+          <a:p>
+            <a:pPr marL="285750" indent="-285750">
+              <a:buFont typeface="Arial" panose="020B0604020202020204" pitchFamily="34" charset="0"/>
+              <a:buChar char="•"/>
+            </a:pPr>
+            <a:r>
+              <a:rPr lang="en-US" dirty="0"/>
+              <a:t>Reverse Indexing</a:t>
+            </a:r>
+          </a:p>
+          <a:p>
+            <a:pPr marL="285750" indent="-285750">
+              <a:buFont typeface="Segoe UI" panose="020B0502040204020203" pitchFamily="34" charset="0"/>
+              <a:buChar char="•"/>
+            </a:pPr>
+            <a:r>
+              <a:rPr lang="en-US" dirty="0"/>
+              <a:t>Page Ranking Criteria</a:t>
+            </a:r>
+          </a:p>
+          <a:p>
+            <a:pPr marL="285750" indent="-285750">
+              <a:buFont typeface="Arial" panose="020B0604020202020204" pitchFamily="34" charset="0"/>
+              <a:buChar char="•"/>
+            </a:pPr>
+            <a:r>
+              <a:rPr lang="en-US" dirty="0"/>
+              <a:t>Single Word Searching</a:t>
+            </a:r>
+          </a:p>
+          <a:p>
+            <a:pPr marL="285750" indent="-285750">
+              <a:buFont typeface="Arial" panose="020B0604020202020204" pitchFamily="34" charset="0"/>
+              <a:buChar char="•"/>
+            </a:pPr>
+            <a:r>
+              <a:rPr lang="en-US" dirty="0"/>
+              <a:t>Multiple Words Searching</a:t>
+            </a:r>
+          </a:p>
+          <a:p>
+            <a:pPr marL="285750" indent="-285750">
+              <a:buFont typeface="Arial" panose="020B0604020202020204" pitchFamily="34" charset="0"/>
+              <a:buChar char="•"/>
+            </a:pPr>
+            <a:r>
+              <a:rPr lang="en-US" dirty="0"/>
+              <a:t>GUI</a:t>
+            </a:r>
+          </a:p>
+          <a:p>
+            <a:pPr marL="285750" indent="-285750">
+              <a:buFont typeface="Arial" panose="020B0604020202020204" pitchFamily="34" charset="0"/>
+              <a:buChar char="•"/>
+            </a:pPr>
+            <a:r>
+              <a:rPr lang="en-US" dirty="0"/>
+              <a:t>Commit History on BitBucket.org</a:t>
+            </a:r>
+          </a:p>
+          <a:p>
+            <a:pPr marL="285750" indent="-285750">
+              <a:buFont typeface="Arial" panose="020B0604020202020204" pitchFamily="34" charset="0"/>
+              <a:buChar char="•"/>
+            </a:pPr>
+            <a:endParaRPr lang="en-US" dirty="0"/>
           </a:p>
         </p:txBody>
       </p:sp>
@@ -5383,7 +5220,7 @@
     </p:spTree>
     <p:extLst>
       <p:ext uri="{BB962C8B-B14F-4D97-AF65-F5344CB8AC3E}">
-        <p14:creationId xmlns:p14="http://schemas.microsoft.com/office/powerpoint/2010/main" val="2563607408"/>
+        <p14:creationId xmlns:p14="http://schemas.microsoft.com/office/powerpoint/2010/main" val="2202980107"/>
       </p:ext>
     </p:extLst>
   </p:cSld>
@@ -5426,10 +5263,9 @@
           <a:lstStyle/>
           <a:p>
             <a:r>
-              <a:rPr lang="en-US" dirty="0" smtClean="0"/>
-              <a:t>Contents</a:t>
-            </a:r>
-            <a:endParaRPr lang="en-US" dirty="0"/>
+              <a:rPr lang="en-US" dirty="0"/>
+              <a:t>Dataset </a:t>
+            </a:r>
           </a:p>
         </p:txBody>
       </p:sp>
@@ -5443,16 +5279,9 @@
             <p:ph sz="quarter" idx="13"/>
           </p:nvPr>
         </p:nvSpPr>
-        <p:spPr>
-          <a:xfrm>
-            <a:off x="1752600" y="1444751"/>
-            <a:ext cx="10076688" cy="4806419"/>
-          </a:xfrm>
-        </p:spPr>
-        <p:txBody>
-          <a:bodyPr>
-            <a:normAutofit/>
-          </a:bodyPr>
+        <p:spPr/>
+        <p:txBody>
+          <a:bodyPr/>
           <a:lstStyle/>
           <a:p>
             <a:pPr marL="285750" indent="-285750">
@@ -5460,8 +5289,8 @@
               <a:buChar char="•"/>
             </a:pPr>
             <a:r>
-              <a:rPr lang="en-US" dirty="0" smtClean="0"/>
-              <a:t>Dataset</a:t>
+              <a:rPr lang="en-US" dirty="0"/>
+              <a:t>Wikipedia Dataset </a:t>
             </a:r>
           </a:p>
           <a:p>
@@ -5471,13 +5300,8 @@
             </a:pPr>
             <a:r>
               <a:rPr lang="en-US" dirty="0"/>
-              <a:t>Technologies </a:t>
-            </a:r>
-            <a:r>
-              <a:rPr lang="en-US" dirty="0" smtClean="0"/>
-              <a:t>Used</a:t>
-            </a:r>
-            <a:endParaRPr lang="en-US" dirty="0" smtClean="0"/>
+              <a:t>2008 version</a:t>
+            </a:r>
           </a:p>
           <a:p>
             <a:pPr marL="285750" indent="-285750">
@@ -5485,106 +5309,11 @@
               <a:buChar char="•"/>
             </a:pPr>
             <a:r>
-              <a:rPr lang="en-US" dirty="0" smtClean="0"/>
-              <a:t>Crawler</a:t>
-            </a:r>
-            <a:endParaRPr lang="en-US" dirty="0"/>
-          </a:p>
-          <a:p>
-            <a:pPr marL="285750" indent="-285750">
-              <a:buFont typeface="Arial" panose="020B0604020202020204" pitchFamily="34" charset="0"/>
-              <a:buChar char="•"/>
-            </a:pPr>
-            <a:r>
-              <a:rPr lang="en-US" dirty="0" smtClean="0"/>
-              <a:t>Parser</a:t>
-            </a:r>
-          </a:p>
-          <a:p>
-            <a:pPr marL="285750" indent="-285750">
-              <a:buFont typeface="Arial" panose="020B0604020202020204" pitchFamily="34" charset="0"/>
-              <a:buChar char="•"/>
-            </a:pPr>
-            <a:r>
-              <a:rPr lang="en-US" dirty="0" smtClean="0"/>
-              <a:t>Forward vs Reverse Indexing</a:t>
-            </a:r>
-          </a:p>
-          <a:p>
-            <a:pPr marL="285750" indent="-285750">
-              <a:buFont typeface="Arial" panose="020B0604020202020204" pitchFamily="34" charset="0"/>
-              <a:buChar char="•"/>
-            </a:pPr>
-            <a:r>
-              <a:rPr lang="en-US" dirty="0" smtClean="0"/>
-              <a:t>Forward Indexing</a:t>
-            </a:r>
-          </a:p>
-          <a:p>
-            <a:pPr marL="285750" indent="-285750">
-              <a:buFont typeface="Arial" panose="020B0604020202020204" pitchFamily="34" charset="0"/>
-              <a:buChar char="•"/>
-            </a:pPr>
-            <a:r>
-              <a:rPr lang="en-US" dirty="0" smtClean="0"/>
-              <a:t>Reverse Indexing</a:t>
-            </a:r>
-          </a:p>
-          <a:p>
-            <a:pPr marL="285750" indent="-285750">
-              <a:buFont typeface="Segoe UI" panose="020B0502040204020203" pitchFamily="34" charset="0"/>
-              <a:buChar char="•"/>
-            </a:pPr>
-            <a:r>
-              <a:rPr lang="en-US" dirty="0" smtClean="0"/>
-              <a:t>Page Ranking Criteria</a:t>
-            </a:r>
-          </a:p>
-          <a:p>
-            <a:pPr marL="285750" indent="-285750">
-              <a:buFont typeface="Arial" panose="020B0604020202020204" pitchFamily="34" charset="0"/>
-              <a:buChar char="•"/>
-            </a:pPr>
-            <a:r>
-              <a:rPr lang="en-US" dirty="0" smtClean="0"/>
-              <a:t>Single Word Searching</a:t>
-            </a:r>
-          </a:p>
-          <a:p>
-            <a:pPr marL="285750" indent="-285750">
-              <a:buFont typeface="Arial" panose="020B0604020202020204" pitchFamily="34" charset="0"/>
-              <a:buChar char="•"/>
-            </a:pPr>
-            <a:r>
-              <a:rPr lang="en-US" dirty="0" smtClean="0"/>
-              <a:t>Multiple Words Searching</a:t>
-            </a:r>
-          </a:p>
-          <a:p>
-            <a:pPr marL="285750" indent="-285750">
-              <a:buFont typeface="Arial" panose="020B0604020202020204" pitchFamily="34" charset="0"/>
-              <a:buChar char="•"/>
-            </a:pPr>
-            <a:r>
-              <a:rPr lang="en-US" dirty="0" smtClean="0"/>
-              <a:t>GUI</a:t>
-            </a:r>
-          </a:p>
-          <a:p>
-            <a:pPr marL="285750" indent="-285750">
-              <a:buFont typeface="Arial" panose="020B0604020202020204" pitchFamily="34" charset="0"/>
-              <a:buChar char="•"/>
-            </a:pPr>
-            <a:r>
-              <a:rPr lang="en-US" dirty="0" smtClean="0"/>
-              <a:t>Commit History on BitBucket.org</a:t>
-            </a:r>
-          </a:p>
-          <a:p>
-            <a:pPr marL="285750" indent="-285750">
-              <a:buFont typeface="Arial" panose="020B0604020202020204" pitchFamily="34" charset="0"/>
-              <a:buChar char="•"/>
-            </a:pPr>
+              <a:rPr lang="en-US" dirty="0"/>
+              <a:t>Used 50001 out of 109832 html files</a:t>
+            </a:r>
+          </a:p>
+          <a:p>
             <a:endParaRPr lang="en-US" dirty="0"/>
           </a:p>
         </p:txBody>
@@ -5616,7 +5345,7 @@
     </p:spTree>
     <p:extLst>
       <p:ext uri="{BB962C8B-B14F-4D97-AF65-F5344CB8AC3E}">
-        <p14:creationId xmlns:p14="http://schemas.microsoft.com/office/powerpoint/2010/main" val="2202980107"/>
+        <p14:creationId xmlns:p14="http://schemas.microsoft.com/office/powerpoint/2010/main" val="3688052086"/>
       </p:ext>
     </p:extLst>
   </p:cSld>
@@ -5659,10 +5388,9 @@
           <a:lstStyle/>
           <a:p>
             <a:r>
-              <a:rPr lang="en-US" dirty="0" smtClean="0"/>
-              <a:t>Dataset </a:t>
-            </a:r>
-            <a:endParaRPr lang="en-US" dirty="0"/>
+              <a:rPr lang="en-US" dirty="0"/>
+              <a:t>Technologies Used</a:t>
+            </a:r>
           </a:p>
         </p:txBody>
       </p:sp>
@@ -5686,8 +5414,8 @@
               <a:buChar char="•"/>
             </a:pPr>
             <a:r>
-              <a:rPr lang="en-US" dirty="0" smtClean="0"/>
-              <a:t>Wikipedia Dataset </a:t>
+              <a:rPr lang="en-US" b="1" dirty="0"/>
+              <a:t>Beautiful Soup 4</a:t>
             </a:r>
           </a:p>
           <a:p>
@@ -5696,9 +5424,10 @@
               <a:buChar char="•"/>
             </a:pPr>
             <a:r>
-              <a:rPr lang="en-US" dirty="0" smtClean="0"/>
-              <a:t>2008 version</a:t>
-            </a:r>
+              <a:rPr lang="en-US" b="1" dirty="0" err="1"/>
+              <a:t>Tkinter</a:t>
+            </a:r>
+            <a:endParaRPr lang="en-US" b="1" dirty="0"/>
           </a:p>
           <a:p>
             <a:pPr marL="285750" indent="-285750">
@@ -5706,12 +5435,36 @@
               <a:buChar char="•"/>
             </a:pPr>
             <a:r>
-              <a:rPr lang="en-US" dirty="0" smtClean="0"/>
-              <a:t>Used 50001 out of 109832 html files</a:t>
-            </a:r>
-          </a:p>
-          <a:p>
-            <a:endParaRPr lang="en-US" dirty="0"/>
+              <a:rPr lang="en-US" b="1" dirty="0"/>
+              <a:t>SQLite 3</a:t>
+            </a:r>
+          </a:p>
+          <a:p>
+            <a:pPr marL="285750" indent="-285750">
+              <a:buFont typeface="Arial" panose="020B0604020202020204" pitchFamily="34" charset="0"/>
+              <a:buChar char="•"/>
+            </a:pPr>
+            <a:r>
+              <a:rPr lang="en-US" b="1" dirty="0"/>
+              <a:t>Python 3.7 </a:t>
+            </a:r>
+          </a:p>
+          <a:p>
+            <a:pPr marL="285750" indent="-285750">
+              <a:buFont typeface="Arial" panose="020B0604020202020204" pitchFamily="34" charset="0"/>
+              <a:buChar char="•"/>
+            </a:pPr>
+            <a:r>
+              <a:rPr lang="en-US" b="1" dirty="0"/>
+              <a:t>Regex </a:t>
+            </a:r>
+          </a:p>
+          <a:p>
+            <a:pPr marL="285750" indent="-285750">
+              <a:buFont typeface="Arial" panose="020B0604020202020204" pitchFamily="34" charset="0"/>
+              <a:buChar char="•"/>
+            </a:pPr>
+            <a:endParaRPr lang="en-US" b="1" dirty="0"/>
           </a:p>
         </p:txBody>
       </p:sp>
@@ -5742,7 +5495,7 @@
     </p:spTree>
     <p:extLst>
       <p:ext uri="{BB962C8B-B14F-4D97-AF65-F5344CB8AC3E}">
-        <p14:creationId xmlns:p14="http://schemas.microsoft.com/office/powerpoint/2010/main" val="3688052086"/>
+        <p14:creationId xmlns:p14="http://schemas.microsoft.com/office/powerpoint/2010/main" val="3225233322"/>
       </p:ext>
     </p:extLst>
   </p:cSld>
@@ -5785,84 +5538,9 @@
           <a:lstStyle/>
           <a:p>
             <a:r>
-              <a:rPr lang="en-US" dirty="0" smtClean="0"/>
-              <a:t>Technologies Used</a:t>
-            </a:r>
-            <a:endParaRPr lang="en-US" dirty="0"/>
-          </a:p>
-        </p:txBody>
-      </p:sp>
-      <p:sp>
-        <p:nvSpPr>
-          <p:cNvPr id="3" name="Content Placeholder 2"/>
-          <p:cNvSpPr>
-            <a:spLocks noGrp="1"/>
-          </p:cNvSpPr>
-          <p:nvPr>
-            <p:ph sz="quarter" idx="13"/>
-          </p:nvPr>
-        </p:nvSpPr>
-        <p:spPr/>
-        <p:txBody>
-          <a:bodyPr/>
-          <a:lstStyle/>
-          <a:p>
-            <a:pPr marL="285750" indent="-285750">
-              <a:buFont typeface="Arial" panose="020B0604020202020204" pitchFamily="34" charset="0"/>
-              <a:buChar char="•"/>
-            </a:pPr>
-            <a:r>
-              <a:rPr lang="en-US" b="1" dirty="0" smtClean="0"/>
-              <a:t>Beautiful Soup 4</a:t>
-            </a:r>
-          </a:p>
-          <a:p>
-            <a:pPr marL="285750" indent="-285750">
-              <a:buFont typeface="Arial" panose="020B0604020202020204" pitchFamily="34" charset="0"/>
-              <a:buChar char="•"/>
-            </a:pPr>
-            <a:r>
-              <a:rPr lang="en-US" b="1" dirty="0" err="1" smtClean="0"/>
-              <a:t>Tkinter</a:t>
-            </a:r>
-            <a:endParaRPr lang="en-US" b="1" dirty="0" smtClean="0"/>
-          </a:p>
-          <a:p>
-            <a:pPr marL="285750" indent="-285750">
-              <a:buFont typeface="Arial" panose="020B0604020202020204" pitchFamily="34" charset="0"/>
-              <a:buChar char="•"/>
-            </a:pPr>
-            <a:r>
-              <a:rPr lang="en-US" b="1" dirty="0" smtClean="0"/>
-              <a:t>SQLite 3</a:t>
-            </a:r>
-          </a:p>
-          <a:p>
-            <a:pPr marL="285750" indent="-285750">
-              <a:buFont typeface="Arial" panose="020B0604020202020204" pitchFamily="34" charset="0"/>
-              <a:buChar char="•"/>
-            </a:pPr>
-            <a:r>
-              <a:rPr lang="en-US" b="1" dirty="0" smtClean="0"/>
-              <a:t>Python 3.7 </a:t>
-            </a:r>
-          </a:p>
-          <a:p>
-            <a:pPr marL="285750" indent="-285750">
-              <a:buFont typeface="Arial" panose="020B0604020202020204" pitchFamily="34" charset="0"/>
-              <a:buChar char="•"/>
-            </a:pPr>
-            <a:r>
-              <a:rPr lang="en-US" b="1" dirty="0" smtClean="0"/>
-              <a:t>Regex </a:t>
-            </a:r>
-          </a:p>
-          <a:p>
-            <a:pPr marL="285750" indent="-285750">
-              <a:buFont typeface="Arial" panose="020B0604020202020204" pitchFamily="34" charset="0"/>
-              <a:buChar char="•"/>
-            </a:pPr>
-            <a:endParaRPr lang="en-US" b="1" dirty="0"/>
+              <a:rPr lang="en-US" dirty="0"/>
+              <a:t>Crawler</a:t>
+            </a:r>
           </a:p>
         </p:txBody>
       </p:sp>
@@ -5885,83 +5563,6 @@
               <a:rPr lang="en-US" smtClean="0"/>
               <a:pPr/>
               <a:t>5</a:t>
-            </a:fld>
-            <a:endParaRPr lang="en-US" dirty="0"/>
-          </a:p>
-        </p:txBody>
-      </p:sp>
-    </p:spTree>
-    <p:extLst>
-      <p:ext uri="{BB962C8B-B14F-4D97-AF65-F5344CB8AC3E}">
-        <p14:creationId xmlns:p14="http://schemas.microsoft.com/office/powerpoint/2010/main" val="3225233322"/>
-      </p:ext>
-    </p:extLst>
-  </p:cSld>
-  <p:clrMapOvr>
-    <a:masterClrMapping/>
-  </p:clrMapOvr>
-</p:sld>
-</file>
-
-<file path=ppt/slides/slide6.xml><?xml version="1.0" encoding="utf-8"?>
-<p:sld xmlns:a="http://schemas.openxmlformats.org/drawingml/2006/main" xmlns:r="http://schemas.openxmlformats.org/officeDocument/2006/relationships" xmlns:p="http://schemas.openxmlformats.org/presentationml/2006/main">
-  <p:cSld>
-    <p:spTree>
-      <p:nvGrpSpPr>
-        <p:cNvPr id="1" name=""/>
-        <p:cNvGrpSpPr/>
-        <p:nvPr/>
-      </p:nvGrpSpPr>
-      <p:grpSpPr>
-        <a:xfrm>
-          <a:off x="0" y="0"/>
-          <a:ext cx="0" cy="0"/>
-          <a:chOff x="0" y="0"/>
-          <a:chExt cx="0" cy="0"/>
-        </a:xfrm>
-      </p:grpSpPr>
-      <p:sp>
-        <p:nvSpPr>
-          <p:cNvPr id="2" name="Title 1"/>
-          <p:cNvSpPr>
-            <a:spLocks noGrp="1"/>
-          </p:cNvSpPr>
-          <p:nvPr>
-            <p:ph type="title"/>
-          </p:nvPr>
-        </p:nvSpPr>
-        <p:spPr/>
-        <p:txBody>
-          <a:bodyPr/>
-          <a:lstStyle/>
-          <a:p>
-            <a:r>
-              <a:rPr lang="en-US" dirty="0" smtClean="0"/>
-              <a:t>Crawler</a:t>
-            </a:r>
-            <a:endParaRPr lang="en-US" dirty="0"/>
-          </a:p>
-        </p:txBody>
-      </p:sp>
-      <p:sp>
-        <p:nvSpPr>
-          <p:cNvPr id="4" name="Slide Number Placeholder 3"/>
-          <p:cNvSpPr>
-            <a:spLocks noGrp="1"/>
-          </p:cNvSpPr>
-          <p:nvPr>
-            <p:ph type="sldNum" sz="quarter" idx="12"/>
-          </p:nvPr>
-        </p:nvSpPr>
-        <p:spPr/>
-        <p:txBody>
-          <a:bodyPr/>
-          <a:lstStyle/>
-          <a:p>
-            <a:fld id="{9860EDB8-5305-433F-BE41-D7A86D811DB3}" type="slidenum">
-              <a:rPr lang="en-US" smtClean="0"/>
-              <a:pPr/>
-              <a:t>6</a:t>
             </a:fld>
             <a:endParaRPr lang="en-US" dirty="0"/>
           </a:p>
@@ -6004,7 +5605,7 @@
 </p:sld>
 </file>
 
-<file path=ppt/slides/slide7.xml><?xml version="1.0" encoding="utf-8"?>
+<file path=ppt/slides/slide6.xml><?xml version="1.0" encoding="utf-8"?>
 <p:sld xmlns:a="http://schemas.openxmlformats.org/drawingml/2006/main" xmlns:r="http://schemas.openxmlformats.org/officeDocument/2006/relationships" xmlns:p="http://schemas.openxmlformats.org/presentationml/2006/main">
   <p:cSld>
     <p:spTree>
@@ -6037,10 +5638,9 @@
           <a:lstStyle/>
           <a:p>
             <a:r>
-              <a:rPr lang="en-US" dirty="0" smtClean="0"/>
+              <a:rPr lang="en-US" dirty="0"/>
               <a:t>Parser</a:t>
             </a:r>
-            <a:endParaRPr lang="en-US" dirty="0"/>
           </a:p>
         </p:txBody>
       </p:sp>
@@ -6064,15 +5664,15 @@
               <a:buChar char="•"/>
             </a:pPr>
             <a:r>
-              <a:rPr lang="en-US" b="1" dirty="0" smtClean="0"/>
+              <a:rPr lang="en-US" b="1" dirty="0"/>
               <a:t>Beautiful Soup was used for parsing.</a:t>
             </a:r>
           </a:p>
           <a:p>
-            <a:endParaRPr lang="en-US" dirty="0" smtClean="0"/>
-          </a:p>
-          <a:p>
-            <a:endParaRPr lang="en-US" dirty="0" smtClean="0"/>
+            <a:endParaRPr lang="en-US" dirty="0"/>
+          </a:p>
+          <a:p>
+            <a:endParaRPr lang="en-US" dirty="0"/>
           </a:p>
           <a:p>
             <a:endParaRPr lang="en-US" dirty="0"/>
@@ -6097,7 +5697,7 @@
             <a:fld id="{9860EDB8-5305-433F-BE41-D7A86D811DB3}" type="slidenum">
               <a:rPr lang="en-US" smtClean="0"/>
               <a:pPr/>
-              <a:t>7</a:t>
+              <a:t>6</a:t>
             </a:fld>
             <a:endParaRPr lang="en-US" dirty="0"/>
           </a:p>
@@ -6139,6 +5739,108 @@
 </p:sld>
 </file>
 
+<file path=ppt/slides/slide7.xml><?xml version="1.0" encoding="utf-8"?>
+<p:sld xmlns:a="http://schemas.openxmlformats.org/drawingml/2006/main" xmlns:r="http://schemas.openxmlformats.org/officeDocument/2006/relationships" xmlns:p="http://schemas.openxmlformats.org/presentationml/2006/main">
+  <p:cSld>
+    <p:spTree>
+      <p:nvGrpSpPr>
+        <p:cNvPr id="1" name=""/>
+        <p:cNvGrpSpPr/>
+        <p:nvPr/>
+      </p:nvGrpSpPr>
+      <p:grpSpPr>
+        <a:xfrm>
+          <a:off x="0" y="0"/>
+          <a:ext cx="0" cy="0"/>
+          <a:chOff x="0" y="0"/>
+          <a:chExt cx="0" cy="0"/>
+        </a:xfrm>
+      </p:grpSpPr>
+      <p:sp>
+        <p:nvSpPr>
+          <p:cNvPr id="2" name="Title 1"/>
+          <p:cNvSpPr>
+            <a:spLocks noGrp="1"/>
+          </p:cNvSpPr>
+          <p:nvPr>
+            <p:ph type="title"/>
+          </p:nvPr>
+        </p:nvSpPr>
+        <p:spPr/>
+        <p:txBody>
+          <a:bodyPr/>
+          <a:lstStyle/>
+          <a:p>
+            <a:r>
+              <a:rPr lang="en-US" dirty="0"/>
+              <a:t>Parser (continued)</a:t>
+            </a:r>
+          </a:p>
+        </p:txBody>
+      </p:sp>
+      <p:pic>
+        <p:nvPicPr>
+          <p:cNvPr id="5" name="Content Placeholder 4"/>
+          <p:cNvPicPr>
+            <a:picLocks noGrp="1" noChangeAspect="1"/>
+          </p:cNvPicPr>
+          <p:nvPr>
+            <p:ph sz="quarter" idx="13"/>
+          </p:nvPr>
+        </p:nvPicPr>
+        <p:blipFill>
+          <a:blip r:embed="rId2"/>
+          <a:stretch>
+            <a:fillRect/>
+          </a:stretch>
+        </p:blipFill>
+        <p:spPr>
+          <a:xfrm>
+            <a:off x="2043837" y="1735571"/>
+            <a:ext cx="8979585" cy="4389438"/>
+          </a:xfrm>
+          <a:prstGeom prst="rect">
+            <a:avLst/>
+          </a:prstGeom>
+        </p:spPr>
+      </p:pic>
+      <p:sp>
+        <p:nvSpPr>
+          <p:cNvPr id="4" name="Slide Number Placeholder 3"/>
+          <p:cNvSpPr>
+            <a:spLocks noGrp="1"/>
+          </p:cNvSpPr>
+          <p:nvPr>
+            <p:ph type="sldNum" sz="quarter" idx="12"/>
+          </p:nvPr>
+        </p:nvSpPr>
+        <p:spPr/>
+        <p:txBody>
+          <a:bodyPr/>
+          <a:lstStyle/>
+          <a:p>
+            <a:fld id="{9860EDB8-5305-433F-BE41-D7A86D811DB3}" type="slidenum">
+              <a:rPr lang="en-US" smtClean="0"/>
+              <a:pPr/>
+              <a:t>7</a:t>
+            </a:fld>
+            <a:endParaRPr lang="en-US" dirty="0"/>
+          </a:p>
+        </p:txBody>
+      </p:sp>
+    </p:spTree>
+    <p:extLst>
+      <p:ext uri="{BB962C8B-B14F-4D97-AF65-F5344CB8AC3E}">
+        <p14:creationId xmlns:p14="http://schemas.microsoft.com/office/powerpoint/2010/main" val="3128429458"/>
+      </p:ext>
+    </p:extLst>
+  </p:cSld>
+  <p:clrMapOvr>
+    <a:masterClrMapping/>
+  </p:clrMapOvr>
+</p:sld>
+</file>
+
 <file path=ppt/slides/slide8.xml><?xml version="1.0" encoding="utf-8"?>
 <p:sld xmlns:a="http://schemas.openxmlformats.org/drawingml/2006/main" xmlns:r="http://schemas.openxmlformats.org/officeDocument/2006/relationships" xmlns:p="http://schemas.openxmlformats.org/presentationml/2006/main">
   <p:cSld>
@@ -6158,81 +5860,268 @@
       </p:grpSpPr>
       <p:sp>
         <p:nvSpPr>
-          <p:cNvPr id="2" name="Title 1"/>
-          <p:cNvSpPr>
-            <a:spLocks noGrp="1"/>
-          </p:cNvSpPr>
-          <p:nvPr>
-            <p:ph type="title"/>
-          </p:nvPr>
-        </p:nvSpPr>
-        <p:spPr/>
-        <p:txBody>
-          <a:bodyPr/>
-          <a:lstStyle/>
-          <a:p>
-            <a:r>
-              <a:rPr lang="en-US" dirty="0" smtClean="0"/>
-              <a:t>Parser (continued)</a:t>
-            </a:r>
-            <a:endParaRPr lang="en-US" dirty="0"/>
-          </a:p>
-        </p:txBody>
-      </p:sp>
-      <p:pic>
-        <p:nvPicPr>
-          <p:cNvPr id="5" name="Content Placeholder 4"/>
-          <p:cNvPicPr>
-            <a:picLocks noGrp="1" noChangeAspect="1"/>
-          </p:cNvPicPr>
-          <p:nvPr>
-            <p:ph sz="quarter" idx="13"/>
-          </p:nvPr>
-        </p:nvPicPr>
-        <p:blipFill>
-          <a:blip r:embed="rId2"/>
-          <a:stretch>
-            <a:fillRect/>
-          </a:stretch>
-        </p:blipFill>
+          <p:cNvPr id="2" name="Text Placeholder 1"/>
+          <p:cNvSpPr>
+            <a:spLocks noGrp="1"/>
+          </p:cNvSpPr>
+          <p:nvPr>
+            <p:ph type="body" idx="1"/>
+          </p:nvPr>
+        </p:nvSpPr>
+        <p:spPr/>
+        <p:txBody>
+          <a:bodyPr/>
+          <a:lstStyle/>
+          <a:p>
+            <a:r>
+              <a:rPr lang="en-US" dirty="0"/>
+              <a:t>Forward Indexing</a:t>
+            </a:r>
+          </a:p>
+        </p:txBody>
+      </p:sp>
+      <p:sp>
+        <p:nvSpPr>
+          <p:cNvPr id="3" name="Content Placeholder 2"/>
+          <p:cNvSpPr>
+            <a:spLocks noGrp="1"/>
+          </p:cNvSpPr>
+          <p:nvPr>
+            <p:ph sz="half" idx="2"/>
+          </p:nvPr>
+        </p:nvSpPr>
         <p:spPr>
           <a:xfrm>
-            <a:off x="2043837" y="1735571"/>
-            <a:ext cx="8979585" cy="4389438"/>
+            <a:off x="1752600" y="2564701"/>
+            <a:ext cx="4702175" cy="3358261"/>
+          </a:xfrm>
+        </p:spPr>
+        <p:txBody>
+          <a:bodyPr/>
+          <a:lstStyle/>
+          <a:p>
+            <a:pPr marL="285750" indent="-285750">
+              <a:buFont typeface="Arial" panose="020B0604020202020204" pitchFamily="34" charset="0"/>
+              <a:buChar char="•"/>
+            </a:pPr>
+            <a:r>
+              <a:rPr lang="en-GB" dirty="0"/>
+              <a:t>Directs you from document to word</a:t>
+            </a:r>
+          </a:p>
+          <a:p>
+            <a:pPr marL="285750" indent="-285750">
+              <a:buFont typeface="Arial" panose="020B0604020202020204" pitchFamily="34" charset="0"/>
+              <a:buChar char="•"/>
+            </a:pPr>
+            <a:endParaRPr lang="en-GB" dirty="0"/>
+          </a:p>
+          <a:p>
+            <a:pPr marL="285750" indent="-285750">
+              <a:buFont typeface="Arial" panose="020B0604020202020204" pitchFamily="34" charset="0"/>
+              <a:buChar char="•"/>
+            </a:pPr>
+            <a:r>
+              <a:rPr lang="en-GB" dirty="0"/>
+              <a:t>Fast Indexing</a:t>
+            </a:r>
+          </a:p>
+          <a:p>
+            <a:pPr marL="285750" indent="-285750">
+              <a:buFont typeface="Arial" panose="020B0604020202020204" pitchFamily="34" charset="0"/>
+              <a:buChar char="•"/>
+            </a:pPr>
+            <a:endParaRPr lang="en-GB" dirty="0"/>
+          </a:p>
+          <a:p>
+            <a:pPr marL="285750" indent="-285750">
+              <a:buFont typeface="Arial" panose="020B0604020202020204" pitchFamily="34" charset="0"/>
+              <a:buChar char="•"/>
+            </a:pPr>
+            <a:r>
+              <a:rPr lang="en-GB" dirty="0"/>
+              <a:t>Slow/Difficult search</a:t>
+            </a:r>
+            <a:endParaRPr lang="en-US" dirty="0"/>
+          </a:p>
+        </p:txBody>
+      </p:sp>
+      <p:sp>
+        <p:nvSpPr>
+          <p:cNvPr id="4" name="Text Placeholder 3"/>
+          <p:cNvSpPr>
+            <a:spLocks noGrp="1"/>
+          </p:cNvSpPr>
+          <p:nvPr>
+            <p:ph type="body" sz="quarter" idx="3"/>
+          </p:nvPr>
+        </p:nvSpPr>
+        <p:spPr/>
+        <p:txBody>
+          <a:bodyPr/>
+          <a:lstStyle/>
+          <a:p>
+            <a:r>
+              <a:rPr lang="en-US" dirty="0"/>
+              <a:t>Reverse Indexing</a:t>
+            </a:r>
+          </a:p>
+        </p:txBody>
+      </p:sp>
+      <p:sp>
+        <p:nvSpPr>
+          <p:cNvPr id="5" name="Content Placeholder 4"/>
+          <p:cNvSpPr>
+            <a:spLocks noGrp="1"/>
+          </p:cNvSpPr>
+          <p:nvPr>
+            <p:ph sz="quarter" idx="4"/>
+          </p:nvPr>
+        </p:nvSpPr>
+        <p:spPr>
+          <a:xfrm>
+            <a:off x="7107004" y="2564701"/>
+            <a:ext cx="4725332" cy="3684588"/>
+          </a:xfrm>
+        </p:spPr>
+        <p:txBody>
+          <a:bodyPr/>
+          <a:lstStyle/>
+          <a:p>
+            <a:pPr marL="285750" indent="-285750">
+              <a:buFont typeface="Arial" panose="020B0604020202020204" pitchFamily="34" charset="0"/>
+              <a:buChar char="•"/>
+            </a:pPr>
+            <a:r>
+              <a:rPr lang="en-GB" dirty="0"/>
+              <a:t>Directs you from word to document</a:t>
+            </a:r>
+          </a:p>
+          <a:p>
+            <a:pPr marL="285750" indent="-285750">
+              <a:buFont typeface="Arial" panose="020B0604020202020204" pitchFamily="34" charset="0"/>
+              <a:buChar char="•"/>
+            </a:pPr>
+            <a:endParaRPr lang="en-GB" dirty="0"/>
+          </a:p>
+          <a:p>
+            <a:pPr marL="285750" indent="-285750">
+              <a:buFont typeface="Arial" panose="020B0604020202020204" pitchFamily="34" charset="0"/>
+              <a:buChar char="•"/>
+            </a:pPr>
+            <a:r>
+              <a:rPr lang="en-GB" dirty="0"/>
+              <a:t>Slow Indexing</a:t>
+            </a:r>
+          </a:p>
+          <a:p>
+            <a:pPr marL="285750" indent="-285750">
+              <a:buFont typeface="Arial" panose="020B0604020202020204" pitchFamily="34" charset="0"/>
+              <a:buChar char="•"/>
+            </a:pPr>
+            <a:endParaRPr lang="en-GB" dirty="0"/>
+          </a:p>
+          <a:p>
+            <a:pPr marL="285750" indent="-285750">
+              <a:buFont typeface="Arial" panose="020B0604020202020204" pitchFamily="34" charset="0"/>
+              <a:buChar char="•"/>
+            </a:pPr>
+            <a:r>
+              <a:rPr lang="en-GB" dirty="0"/>
+              <a:t>Fast search</a:t>
+            </a:r>
+          </a:p>
+          <a:p>
+            <a:pPr marL="285750" indent="-285750">
+              <a:buFont typeface="Arial" panose="020B0604020202020204" pitchFamily="34" charset="0"/>
+              <a:buChar char="•"/>
+            </a:pPr>
+            <a:endParaRPr lang="en-US" dirty="0"/>
+          </a:p>
+        </p:txBody>
+      </p:sp>
+      <p:sp>
+        <p:nvSpPr>
+          <p:cNvPr id="6" name="Slide Number Placeholder 5"/>
+          <p:cNvSpPr>
+            <a:spLocks noGrp="1"/>
+          </p:cNvSpPr>
+          <p:nvPr>
+            <p:ph type="sldNum" sz="quarter" idx="12"/>
+          </p:nvPr>
+        </p:nvSpPr>
+        <p:spPr/>
+        <p:txBody>
+          <a:bodyPr/>
+          <a:lstStyle/>
+          <a:p>
+            <a:fld id="{44E4EFAB-AE02-4809-8285-EDC44B9E34E2}" type="slidenum">
+              <a:rPr lang="en-US" smtClean="0"/>
+              <a:t>8</a:t>
+            </a:fld>
+            <a:endParaRPr lang="en-US"/>
+          </a:p>
+        </p:txBody>
+      </p:sp>
+      <p:sp>
+        <p:nvSpPr>
+          <p:cNvPr id="7" name="Title 6"/>
+          <p:cNvSpPr>
+            <a:spLocks noGrp="1"/>
+          </p:cNvSpPr>
+          <p:nvPr>
+            <p:ph type="title"/>
+          </p:nvPr>
+        </p:nvSpPr>
+        <p:spPr/>
+        <p:txBody>
+          <a:bodyPr/>
+          <a:lstStyle/>
+          <a:p>
+            <a:r>
+              <a:rPr lang="en-US" dirty="0"/>
+              <a:t>Forward vs Reverse Indexing:</a:t>
+            </a:r>
+          </a:p>
+        </p:txBody>
+      </p:sp>
+      <p:sp>
+        <p:nvSpPr>
+          <p:cNvPr id="8" name="TextBox 7"/>
+          <p:cNvSpPr txBox="1"/>
+          <p:nvPr/>
+        </p:nvSpPr>
+        <p:spPr>
+          <a:xfrm>
+            <a:off x="3187721" y="5553630"/>
+            <a:ext cx="6975628" cy="369332"/>
           </a:xfrm>
           <a:prstGeom prst="rect">
             <a:avLst/>
           </a:prstGeom>
+          <a:noFill/>
         </p:spPr>
-      </p:pic>
-      <p:sp>
-        <p:nvSpPr>
-          <p:cNvPr id="4" name="Slide Number Placeholder 3"/>
-          <p:cNvSpPr>
-            <a:spLocks noGrp="1"/>
-          </p:cNvSpPr>
-          <p:nvPr>
-            <p:ph type="sldNum" sz="quarter" idx="12"/>
-          </p:nvPr>
-        </p:nvSpPr>
-        <p:spPr/>
-        <p:txBody>
-          <a:bodyPr/>
-          <a:lstStyle/>
-          <a:p>
-            <a:fld id="{9860EDB8-5305-433F-BE41-D7A86D811DB3}" type="slidenum">
-              <a:rPr lang="en-US" smtClean="0"/>
-              <a:pPr/>
-              <a:t>8</a:t>
-            </a:fld>
-            <a:endParaRPr lang="en-US" dirty="0"/>
+        <p:txBody>
+          <a:bodyPr wrap="none" rtlCol="0">
+            <a:spAutoFit/>
+          </a:bodyPr>
+          <a:lstStyle/>
+          <a:p>
+            <a:pPr marL="285750" indent="-285750" algn="ctr">
+              <a:buFont typeface="Arial" panose="020B0604020202020204" pitchFamily="34" charset="0"/>
+              <a:buChar char="•"/>
+            </a:pPr>
+            <a:r>
+              <a:rPr lang="en-US" dirty="0"/>
+              <a:t>Both are used to search text in document or a set of documents.</a:t>
+            </a:r>
           </a:p>
         </p:txBody>
       </p:sp>
     </p:spTree>
     <p:extLst>
       <p:ext uri="{BB962C8B-B14F-4D97-AF65-F5344CB8AC3E}">
-        <p14:creationId xmlns:p14="http://schemas.microsoft.com/office/powerpoint/2010/main" val="3128429458"/>
+        <p14:creationId xmlns:p14="http://schemas.microsoft.com/office/powerpoint/2010/main" val="3963917884"/>
       </p:ext>
     </p:extLst>
   </p:cSld>
@@ -6261,24 +6150,23 @@
       </p:grpSpPr>
       <p:sp>
         <p:nvSpPr>
-          <p:cNvPr id="2" name="Text Placeholder 1"/>
-          <p:cNvSpPr>
-            <a:spLocks noGrp="1"/>
-          </p:cNvSpPr>
-          <p:nvPr>
-            <p:ph type="body" idx="1"/>
-          </p:nvPr>
-        </p:nvSpPr>
-        <p:spPr/>
-        <p:txBody>
-          <a:bodyPr/>
-          <a:lstStyle/>
-          <a:p>
-            <a:r>
-              <a:rPr lang="en-US" dirty="0" smtClean="0"/>
+          <p:cNvPr id="2" name="Title 1"/>
+          <p:cNvSpPr>
+            <a:spLocks noGrp="1"/>
+          </p:cNvSpPr>
+          <p:nvPr>
+            <p:ph type="title"/>
+          </p:nvPr>
+        </p:nvSpPr>
+        <p:spPr/>
+        <p:txBody>
+          <a:bodyPr/>
+          <a:lstStyle/>
+          <a:p>
+            <a:r>
+              <a:rPr lang="en-US" dirty="0"/>
               <a:t>Forward Indexing</a:t>
             </a:r>
-            <a:endParaRPr lang="en-US" dirty="0"/>
           </a:p>
         </p:txBody>
       </p:sp>
@@ -6289,15 +6177,10 @@
             <a:spLocks noGrp="1"/>
           </p:cNvSpPr>
           <p:nvPr>
-            <p:ph sz="half" idx="2"/>
-          </p:nvPr>
-        </p:nvSpPr>
-        <p:spPr>
-          <a:xfrm>
-            <a:off x="1752600" y="2564701"/>
-            <a:ext cx="4702175" cy="3358261"/>
-          </a:xfrm>
-        </p:spPr>
+            <p:ph sz="quarter" idx="13"/>
+          </p:nvPr>
+        </p:nvSpPr>
+        <p:spPr/>
         <p:txBody>
           <a:bodyPr/>
           <a:lstStyle/>
@@ -6307,271 +6190,94 @@
               <a:buChar char="•"/>
             </a:pPr>
             <a:r>
-              <a:rPr lang="en-GB" dirty="0"/>
-              <a:t>D</a:t>
-            </a:r>
-            <a:r>
-              <a:rPr lang="en-GB" dirty="0" smtClean="0"/>
-              <a:t>irects </a:t>
-            </a:r>
-            <a:r>
-              <a:rPr lang="en-GB" dirty="0"/>
-              <a:t>you from document to </a:t>
-            </a:r>
-            <a:r>
-              <a:rPr lang="en-GB" dirty="0" smtClean="0"/>
-              <a:t>word</a:t>
-            </a:r>
-            <a:endParaRPr lang="en-GB" dirty="0" smtClean="0"/>
+              <a:rPr lang="en-GB" b="1" dirty="0"/>
+              <a:t>Data structure that stores mapping from documents to words.</a:t>
+            </a:r>
           </a:p>
           <a:p>
             <a:pPr marL="285750" indent="-285750">
               <a:buFont typeface="Arial" panose="020B0604020202020204" pitchFamily="34" charset="0"/>
               <a:buChar char="•"/>
             </a:pPr>
-            <a:endParaRPr lang="en-GB" dirty="0" smtClean="0"/>
-          </a:p>
-          <a:p>
-            <a:pPr marL="285750" indent="-285750">
-              <a:buFont typeface="Arial" panose="020B0604020202020204" pitchFamily="34" charset="0"/>
-              <a:buChar char="•"/>
-            </a:pPr>
-            <a:r>
-              <a:rPr lang="en-GB" dirty="0" smtClean="0"/>
-              <a:t>Fast </a:t>
-            </a:r>
-            <a:r>
-              <a:rPr lang="en-GB" dirty="0" smtClean="0"/>
-              <a:t>Indexing</a:t>
-            </a:r>
-            <a:endParaRPr lang="en-GB" dirty="0" smtClean="0"/>
-          </a:p>
-          <a:p>
-            <a:pPr marL="285750" indent="-285750">
-              <a:buFont typeface="Arial" panose="020B0604020202020204" pitchFamily="34" charset="0"/>
-              <a:buChar char="•"/>
-            </a:pPr>
-            <a:endParaRPr lang="en-GB" dirty="0" smtClean="0"/>
-          </a:p>
-          <a:p>
-            <a:pPr marL="285750" indent="-285750">
-              <a:buFont typeface="Arial" panose="020B0604020202020204" pitchFamily="34" charset="0"/>
-              <a:buChar char="•"/>
-            </a:pPr>
-            <a:r>
-              <a:rPr lang="en-GB" dirty="0" smtClean="0"/>
-              <a:t>Slow/Difficult </a:t>
-            </a:r>
-            <a:r>
-              <a:rPr lang="en-GB" dirty="0" smtClean="0"/>
-              <a:t>search</a:t>
-            </a:r>
+            <a:endParaRPr lang="en-US" b="1" dirty="0"/>
+          </a:p>
+        </p:txBody>
+      </p:sp>
+      <p:sp>
+        <p:nvSpPr>
+          <p:cNvPr id="4" name="Slide Number Placeholder 3"/>
+          <p:cNvSpPr>
+            <a:spLocks noGrp="1"/>
+          </p:cNvSpPr>
+          <p:nvPr>
+            <p:ph type="sldNum" sz="quarter" idx="12"/>
+          </p:nvPr>
+        </p:nvSpPr>
+        <p:spPr/>
+        <p:txBody>
+          <a:bodyPr/>
+          <a:lstStyle/>
+          <a:p>
+            <a:fld id="{9860EDB8-5305-433F-BE41-D7A86D811DB3}" type="slidenum">
+              <a:rPr lang="en-US" smtClean="0"/>
+              <a:pPr/>
+              <a:t>9</a:t>
+            </a:fld>
             <a:endParaRPr lang="en-US" dirty="0"/>
           </a:p>
         </p:txBody>
       </p:sp>
-      <p:sp>
-        <p:nvSpPr>
-          <p:cNvPr id="4" name="Text Placeholder 3"/>
-          <p:cNvSpPr>
-            <a:spLocks noGrp="1"/>
-          </p:cNvSpPr>
-          <p:nvPr>
-            <p:ph type="body" sz="quarter" idx="3"/>
-          </p:nvPr>
-        </p:nvSpPr>
-        <p:spPr/>
-        <p:txBody>
-          <a:bodyPr/>
-          <a:lstStyle/>
-          <a:p>
-            <a:r>
-              <a:rPr lang="en-US" dirty="0" smtClean="0"/>
-              <a:t>Reverse Indexing</a:t>
-            </a:r>
-            <a:endParaRPr lang="en-US" dirty="0"/>
-          </a:p>
-        </p:txBody>
-      </p:sp>
-      <p:sp>
-        <p:nvSpPr>
-          <p:cNvPr id="5" name="Content Placeholder 4"/>
-          <p:cNvSpPr>
-            <a:spLocks noGrp="1"/>
-          </p:cNvSpPr>
-          <p:nvPr>
-            <p:ph sz="quarter" idx="4"/>
-          </p:nvPr>
-        </p:nvSpPr>
+      <p:pic>
+        <p:nvPicPr>
+          <p:cNvPr id="5" name="Picture 4"/>
+          <p:cNvPicPr>
+            <a:picLocks noChangeAspect="1"/>
+          </p:cNvPicPr>
+          <p:nvPr/>
+        </p:nvPicPr>
+        <p:blipFill rotWithShape="1">
+          <a:blip r:embed="rId2"/>
+          <a:srcRect l="5627"/>
+          <a:stretch/>
+        </p:blipFill>
         <p:spPr>
           <a:xfrm>
-            <a:off x="7107004" y="2564701"/>
-            <a:ext cx="4725332" cy="3684588"/>
-          </a:xfrm>
-        </p:spPr>
-        <p:txBody>
-          <a:bodyPr/>
-          <a:lstStyle/>
-          <a:p>
-            <a:pPr marL="285750" indent="-285750">
-              <a:buFont typeface="Arial" panose="020B0604020202020204" pitchFamily="34" charset="0"/>
-              <a:buChar char="•"/>
-            </a:pPr>
-            <a:r>
-              <a:rPr lang="en-GB" dirty="0"/>
-              <a:t>D</a:t>
-            </a:r>
-            <a:r>
-              <a:rPr lang="en-GB" dirty="0" smtClean="0"/>
-              <a:t>irects </a:t>
-            </a:r>
-            <a:r>
-              <a:rPr lang="en-GB" dirty="0"/>
-              <a:t>you from word to </a:t>
-            </a:r>
-            <a:r>
-              <a:rPr lang="en-GB" dirty="0" smtClean="0"/>
-              <a:t>document</a:t>
-            </a:r>
-            <a:endParaRPr lang="en-GB" dirty="0" smtClean="0"/>
-          </a:p>
-          <a:p>
-            <a:pPr marL="285750" indent="-285750">
-              <a:buFont typeface="Arial" panose="020B0604020202020204" pitchFamily="34" charset="0"/>
-              <a:buChar char="•"/>
-            </a:pPr>
-            <a:endParaRPr lang="en-GB" dirty="0" smtClean="0"/>
-          </a:p>
-          <a:p>
-            <a:pPr marL="285750" indent="-285750">
-              <a:buFont typeface="Arial" panose="020B0604020202020204" pitchFamily="34" charset="0"/>
-              <a:buChar char="•"/>
-            </a:pPr>
-            <a:r>
-              <a:rPr lang="en-GB" dirty="0" smtClean="0"/>
-              <a:t>Slow </a:t>
-            </a:r>
-            <a:r>
-              <a:rPr lang="en-GB" dirty="0" smtClean="0"/>
-              <a:t>Indexing</a:t>
-            </a:r>
-            <a:endParaRPr lang="en-GB" dirty="0" smtClean="0"/>
-          </a:p>
-          <a:p>
-            <a:pPr marL="285750" indent="-285750">
-              <a:buFont typeface="Arial" panose="020B0604020202020204" pitchFamily="34" charset="0"/>
-              <a:buChar char="•"/>
-            </a:pPr>
-            <a:endParaRPr lang="en-GB" dirty="0" smtClean="0"/>
-          </a:p>
-          <a:p>
-            <a:pPr marL="285750" indent="-285750">
-              <a:buFont typeface="Arial" panose="020B0604020202020204" pitchFamily="34" charset="0"/>
-              <a:buChar char="•"/>
-            </a:pPr>
-            <a:r>
-              <a:rPr lang="en-GB" dirty="0" smtClean="0"/>
-              <a:t>Fast </a:t>
-            </a:r>
-            <a:r>
-              <a:rPr lang="en-GB" dirty="0" smtClean="0"/>
-              <a:t>search</a:t>
-            </a:r>
-            <a:endParaRPr lang="en-GB" dirty="0"/>
-          </a:p>
-          <a:p>
-            <a:pPr marL="285750" indent="-285750">
-              <a:buFont typeface="Arial" panose="020B0604020202020204" pitchFamily="34" charset="0"/>
-              <a:buChar char="•"/>
-            </a:pPr>
-            <a:endParaRPr lang="en-US" dirty="0"/>
-          </a:p>
-        </p:txBody>
-      </p:sp>
-      <p:sp>
-        <p:nvSpPr>
-          <p:cNvPr id="6" name="Slide Number Placeholder 5"/>
-          <p:cNvSpPr>
-            <a:spLocks noGrp="1"/>
-          </p:cNvSpPr>
-          <p:nvPr>
-            <p:ph type="sldNum" sz="quarter" idx="12"/>
-          </p:nvPr>
-        </p:nvSpPr>
-        <p:spPr/>
-        <p:txBody>
-          <a:bodyPr/>
-          <a:lstStyle/>
-          <a:p>
-            <a:fld id="{44E4EFAB-AE02-4809-8285-EDC44B9E34E2}" type="slidenum">
-              <a:rPr lang="en-US" smtClean="0"/>
-              <a:t>9</a:t>
-            </a:fld>
-            <a:endParaRPr lang="en-US"/>
-          </a:p>
-        </p:txBody>
-      </p:sp>
-      <p:sp>
-        <p:nvSpPr>
-          <p:cNvPr id="7" name="Title 6"/>
-          <p:cNvSpPr>
-            <a:spLocks noGrp="1"/>
-          </p:cNvSpPr>
-          <p:nvPr>
-            <p:ph type="title"/>
-          </p:nvPr>
-        </p:nvSpPr>
-        <p:spPr/>
-        <p:txBody>
-          <a:bodyPr/>
-          <a:lstStyle/>
-          <a:p>
-            <a:r>
-              <a:rPr lang="en-US" dirty="0" smtClean="0"/>
-              <a:t>Forward vs Reverse Indexing:</a:t>
-            </a:r>
-            <a:endParaRPr lang="en-US" dirty="0"/>
-          </a:p>
-        </p:txBody>
-      </p:sp>
-      <p:sp>
-        <p:nvSpPr>
-          <p:cNvPr id="8" name="TextBox 7"/>
-          <p:cNvSpPr txBox="1"/>
-          <p:nvPr/>
-        </p:nvSpPr>
-        <p:spPr>
-          <a:xfrm>
-            <a:off x="3187721" y="5553630"/>
-            <a:ext cx="6975628" cy="369332"/>
+            <a:off x="1463039" y="2215585"/>
+            <a:ext cx="10472218" cy="1323975"/>
           </a:xfrm>
           <a:prstGeom prst="rect">
             <a:avLst/>
           </a:prstGeom>
-          <a:noFill/>
         </p:spPr>
-        <p:txBody>
-          <a:bodyPr wrap="none" rtlCol="0">
-            <a:spAutoFit/>
-          </a:bodyPr>
-          <a:lstStyle/>
-          <a:p>
-            <a:pPr marL="285750" indent="-285750" algn="ctr">
-              <a:buFont typeface="Arial" panose="020B0604020202020204" pitchFamily="34" charset="0"/>
-              <a:buChar char="•"/>
-            </a:pPr>
-            <a:r>
-              <a:rPr lang="en-US" dirty="0" smtClean="0"/>
-              <a:t>Both are used to search text in document or a set of documents.</a:t>
-            </a:r>
-            <a:endParaRPr lang="en-US" dirty="0"/>
-          </a:p>
-        </p:txBody>
-      </p:sp>
+      </p:pic>
+      <p:pic>
+        <p:nvPicPr>
+          <p:cNvPr id="7" name="Picture 6"/>
+          <p:cNvPicPr>
+            <a:picLocks noChangeAspect="1"/>
+          </p:cNvPicPr>
+          <p:nvPr/>
+        </p:nvPicPr>
+        <p:blipFill>
+          <a:blip r:embed="rId3"/>
+          <a:stretch>
+            <a:fillRect/>
+          </a:stretch>
+        </p:blipFill>
+        <p:spPr>
+          <a:xfrm>
+            <a:off x="2124347" y="4022000"/>
+            <a:ext cx="5905500" cy="2419350"/>
+          </a:xfrm>
+          <a:prstGeom prst="rect">
+            <a:avLst/>
+          </a:prstGeom>
+        </p:spPr>
+      </p:pic>
     </p:spTree>
     <p:extLst>
       <p:ext uri="{BB962C8B-B14F-4D97-AF65-F5344CB8AC3E}">
-        <p14:creationId xmlns:p14="http://schemas.microsoft.com/office/powerpoint/2010/main" val="3963917884"/>
+        <p14:creationId xmlns:p14="http://schemas.microsoft.com/office/powerpoint/2010/main" val="1266197700"/>
       </p:ext>
     </p:extLst>
   </p:cSld>

</xml_diff>